<commit_message>
Review the ppt and made changes
</commit_message>
<xml_diff>
--- a/research_question.ppt.pptx
+++ b/research_question.ppt.pptx
@@ -254,7 +254,7 @@
             <a:fld id="{93FAAC3A-BD1F-4A00-9099-74B95789FE00}" type="datetimeFigureOut">
               <a:rPr lang="en-GB" smtClean="0"/>
               <a:pPr/>
-              <a:t>29/11/2025</a:t>
+              <a:t>30/11/2025</a:t>
             </a:fld>
             <a:endParaRPr lang="en-GB"/>
           </a:p>
@@ -433,7 +433,7 @@
             <a:fld id="{8E359C8A-39F6-4045-9163-4042C4C26B15}" type="datetimeFigureOut">
               <a:rPr lang="en-GB" smtClean="0"/>
               <a:pPr/>
-              <a:t>29/11/2025</a:t>
+              <a:t>30/11/2025</a:t>
             </a:fld>
             <a:endParaRPr lang="en-GB"/>
           </a:p>
@@ -5341,7 +5341,7 @@
           <a:p>
             <a:r>
               <a:rPr lang="en-GB" dirty="0"/>
-              <a:t>7COM1079-2025  Student Group No:                    Names of Student Group Attendees: </a:t>
+              <a:t>7COM1079-2025  Student Group No:A-196                    Names of Student Group Attendees: </a:t>
             </a:r>
           </a:p>
         </p:txBody>
@@ -7011,12 +7011,11 @@
 </file>
 
 <file path=customXml/item1.xml><?xml version="1.0" encoding="utf-8"?>
-<?mso-contentType ?>
-<FormTemplates xmlns="http://schemas.microsoft.com/sharepoint/v3/contenttype/forms">
-  <Display>DocumentLibraryForm</Display>
-  <Edit>DocumentLibraryForm</Edit>
-  <New>DocumentLibraryForm</New>
-</FormTemplates>
+<p:properties xmlns:p="http://schemas.microsoft.com/office/2006/metadata/properties" xmlns:xsi="http://www.w3.org/2001/XMLSchema-instance" xmlns:pc="http://schemas.microsoft.com/office/infopath/2007/PartnerControls">
+  <documentManagement>
+    <Information xmlns="4ad138b4-2b68-4b70-945d-07f8f18b1c9a" xsi:nil="true"/>
+  </documentManagement>
+</p:properties>
 </file>
 
 <file path=customXml/item2.xml><?xml version="1.0" encoding="utf-8"?>
@@ -7245,17 +7244,27 @@
 </file>
 
 <file path=customXml/item3.xml><?xml version="1.0" encoding="utf-8"?>
-<p:properties xmlns:p="http://schemas.microsoft.com/office/2006/metadata/properties" xmlns:xsi="http://www.w3.org/2001/XMLSchema-instance" xmlns:pc="http://schemas.microsoft.com/office/infopath/2007/PartnerControls">
-  <documentManagement>
-    <Information xmlns="4ad138b4-2b68-4b70-945d-07f8f18b1c9a" xsi:nil="true"/>
-  </documentManagement>
-</p:properties>
+<?mso-contentType ?>
+<FormTemplates xmlns="http://schemas.microsoft.com/sharepoint/v3/contenttype/forms">
+  <Display>DocumentLibraryForm</Display>
+  <Edit>DocumentLibraryForm</Edit>
+  <New>DocumentLibraryForm</New>
+</FormTemplates>
 </file>
 
 <file path=customXml/itemProps1.xml><?xml version="1.0" encoding="utf-8"?>
-<ds:datastoreItem xmlns:ds="http://schemas.openxmlformats.org/officeDocument/2006/customXml" ds:itemID="{91C521DD-2673-4EE6-BB9B-DC5C3320FFBB}">
+<ds:datastoreItem xmlns:ds="http://schemas.openxmlformats.org/officeDocument/2006/customXml" ds:itemID="{EDD1FC41-23C7-41B0-B5F9-BF4CD38AD2ED}">
   <ds:schemaRefs>
-    <ds:schemaRef ds:uri="http://schemas.microsoft.com/sharepoint/v3/contenttype/forms"/>
+    <ds:schemaRef ds:uri="3c474641-ec36-472f-b125-6b1b0910eaa4"/>
+    <ds:schemaRef ds:uri="4ad138b4-2b68-4b70-945d-07f8f18b1c9a"/>
+    <ds:schemaRef ds:uri="http://purl.org/dc/dcmitype/"/>
+    <ds:schemaRef ds:uri="http://purl.org/dc/elements/1.1/"/>
+    <ds:schemaRef ds:uri="http://purl.org/dc/terms/"/>
+    <ds:schemaRef ds:uri="http://schemas.microsoft.com/office/2006/documentManagement/types"/>
+    <ds:schemaRef ds:uri="http://schemas.microsoft.com/office/2006/metadata/properties"/>
+    <ds:schemaRef ds:uri="http://schemas.microsoft.com/office/infopath/2007/PartnerControls"/>
+    <ds:schemaRef ds:uri="http://schemas.openxmlformats.org/package/2006/metadata/core-properties"/>
+    <ds:schemaRef ds:uri="http://www.w3.org/XML/1998/namespace"/>
   </ds:schemaRefs>
 </ds:datastoreItem>
 </file>
@@ -7280,18 +7289,9 @@
 </file>
 
 <file path=customXml/itemProps3.xml><?xml version="1.0" encoding="utf-8"?>
-<ds:datastoreItem xmlns:ds="http://schemas.openxmlformats.org/officeDocument/2006/customXml" ds:itemID="{EDD1FC41-23C7-41B0-B5F9-BF4CD38AD2ED}">
+<ds:datastoreItem xmlns:ds="http://schemas.openxmlformats.org/officeDocument/2006/customXml" ds:itemID="{91C521DD-2673-4EE6-BB9B-DC5C3320FFBB}">
   <ds:schemaRefs>
-    <ds:schemaRef ds:uri="3c474641-ec36-472f-b125-6b1b0910eaa4"/>
-    <ds:schemaRef ds:uri="4ad138b4-2b68-4b70-945d-07f8f18b1c9a"/>
-    <ds:schemaRef ds:uri="http://purl.org/dc/dcmitype/"/>
-    <ds:schemaRef ds:uri="http://purl.org/dc/elements/1.1/"/>
-    <ds:schemaRef ds:uri="http://purl.org/dc/terms/"/>
-    <ds:schemaRef ds:uri="http://schemas.microsoft.com/office/2006/documentManagement/types"/>
-    <ds:schemaRef ds:uri="http://schemas.microsoft.com/office/2006/metadata/properties"/>
-    <ds:schemaRef ds:uri="http://schemas.microsoft.com/office/infopath/2007/PartnerControls"/>
-    <ds:schemaRef ds:uri="http://schemas.openxmlformats.org/package/2006/metadata/core-properties"/>
-    <ds:schemaRef ds:uri="http://www.w3.org/XML/1998/namespace"/>
+    <ds:schemaRef ds:uri="http://schemas.microsoft.com/sharepoint/v3/contenttype/forms"/>
   </ds:schemaRefs>
 </ds:datastoreItem>
 </file>
</xml_diff>

<commit_message>
Made changes in slide 1 3 4
</commit_message>
<xml_diff>
--- a/research_question.ppt.pptx
+++ b/research_question.ppt.pptx
@@ -254,7 +254,7 @@
             <a:fld id="{93FAAC3A-BD1F-4A00-9099-74B95789FE00}" type="datetimeFigureOut">
               <a:rPr lang="en-GB" smtClean="0"/>
               <a:pPr/>
-              <a:t>30/11/2025</a:t>
+              <a:t>01/12/2025</a:t>
             </a:fld>
             <a:endParaRPr lang="en-GB"/>
           </a:p>
@@ -433,7 +433,7 @@
             <a:fld id="{8E359C8A-39F6-4045-9163-4042C4C26B15}" type="datetimeFigureOut">
               <a:rPr lang="en-GB" smtClean="0"/>
               <a:pPr/>
-              <a:t>30/11/2025</a:t>
+              <a:t>01/12/2025</a:t>
             </a:fld>
             <a:endParaRPr lang="en-GB"/>
           </a:p>
@@ -4871,23 +4871,15 @@
           <a:p>
             <a:r>
               <a:rPr lang="en-GB" dirty="0"/>
-              <a:t>7COM1079-2025  Student Group No:  Group A 196                  Names of Student Attendees : </a:t>
+              <a:t>7COM1079-2025  Student Group No:  Group A 196                  Names of Student Attendees : Gourav Kamble, Shrinidhi G, Britto George Fernandez, Kavya </a:t>
             </a:r>
             <a:r>
               <a:rPr lang="en-GB" dirty="0" err="1"/>
-              <a:t>Gourav</a:t>
+              <a:t>Belur</a:t>
             </a:r>
             <a:r>
               <a:rPr lang="en-GB" dirty="0"/>
-              <a:t>, </a:t>
-            </a:r>
-            <a:r>
-              <a:rPr lang="en-GB" dirty="0" err="1"/>
-              <a:t>Shrinidhi</a:t>
-            </a:r>
-            <a:r>
-              <a:rPr lang="en-GB" dirty="0"/>
-              <a:t> G, Britto G F, Kavya B R</a:t>
+              <a:t> Ramesh</a:t>
             </a:r>
           </a:p>
         </p:txBody>
@@ -5272,8 +5264,8 @@
         </p:nvSpPr>
         <p:spPr>
           <a:xfrm>
-            <a:off x="965288" y="1285092"/>
-            <a:ext cx="10110240" cy="588024"/>
+            <a:off x="426481" y="1051202"/>
+            <a:ext cx="10974944" cy="588024"/>
           </a:xfrm>
         </p:spPr>
         <p:txBody>
@@ -5283,11 +5275,11 @@
           <a:lstStyle/>
           <a:p>
             <a:r>
-              <a:rPr lang="en-US" dirty="0"/>
+              <a:rPr lang="en-US" sz="2400" dirty="0"/>
               <a:t>Dataset </a:t>
             </a:r>
             <a:r>
-              <a:rPr lang="en-US" dirty="0">
+              <a:rPr lang="en-US" sz="2400" dirty="0">
                 <a:solidFill>
                   <a:srgbClr val="203232"/>
                 </a:solidFill>
@@ -5297,18 +5289,18 @@
             <a:r>
               <a:rPr lang="en-US" sz="1600" dirty="0">
                 <a:solidFill>
-                  <a:srgbClr val="FF0000"/>
+                  <a:schemeClr val="tx1"/>
                 </a:solidFill>
               </a:rPr>
-              <a:t>:   </a:t>
+              <a:t>: </a:t>
             </a:r>
             <a:r>
               <a:rPr lang="en-US" sz="2400" dirty="0">
                 <a:solidFill>
-                  <a:srgbClr val="FF0000"/>
+                  <a:schemeClr val="tx1"/>
                 </a:solidFill>
               </a:rPr>
-              <a:t>DS048 and filename:</a:t>
+              <a:t>DS048 and filename: 2006-2012-math-test-results-school-gender-1.csv </a:t>
             </a:r>
           </a:p>
         </p:txBody>
@@ -5331,8 +5323,8 @@
         </p:nvSpPr>
         <p:spPr>
           <a:xfrm>
-            <a:off x="965288" y="791022"/>
-            <a:ext cx="9129687" cy="230832"/>
+            <a:off x="426481" y="404099"/>
+            <a:ext cx="10879694" cy="588024"/>
           </a:xfrm>
         </p:spPr>
         <p:txBody>
@@ -5341,7 +5333,23 @@
           <a:p>
             <a:r>
               <a:rPr lang="en-GB" dirty="0"/>
-              <a:t>7COM1079-2025  Student Group No:A-196                    Names of Student Group Attendees: </a:t>
+              <a:t>7COM1079-2025  Student Group No:A-196                    Names of Student Group Attendees: Gourav Kamble, </a:t>
+            </a:r>
+            <a:r>
+              <a:rPr lang="en-GB" dirty="0" err="1"/>
+              <a:t>Shirnidhi</a:t>
+            </a:r>
+            <a:r>
+              <a:rPr lang="en-GB" dirty="0"/>
+              <a:t> , Britto      George Fernandez, Kavya </a:t>
+            </a:r>
+            <a:r>
+              <a:rPr lang="en-GB" dirty="0" err="1"/>
+              <a:t>Belur</a:t>
+            </a:r>
+            <a:r>
+              <a:rPr lang="en-GB" dirty="0"/>
+              <a:t> Ramesh </a:t>
             </a:r>
           </a:p>
         </p:txBody>
@@ -5373,10 +5381,10 @@
           <a:lstStyle/>
           <a:p>
             <a:r>
-              <a:rPr lang="en-US"/>
+              <a:rPr lang="en-US" dirty="0"/>
               <a:t>2</a:t>
             </a:r>
-            <a:endParaRPr lang="en-GB"/>
+            <a:endParaRPr lang="en-GB" dirty="0"/>
           </a:p>
         </p:txBody>
       </p:sp>
@@ -5398,8 +5406,8 @@
         </p:nvSpPr>
         <p:spPr>
           <a:xfrm>
-            <a:off x="965288" y="1698305"/>
-            <a:ext cx="10974945" cy="3579548"/>
+            <a:off x="426480" y="1698305"/>
+            <a:ext cx="11513753" cy="3579548"/>
           </a:xfrm>
         </p:spPr>
         <p:txBody>
@@ -5792,7 +5800,7 @@
                 <a:latin typeface="Arial"/>
                 <a:cs typeface="Arial"/>
               </a:rPr>
-              <a:t>): There is no difference in the mean </a:t>
+              <a:t>): There is no difference in the mean of the </a:t>
             </a:r>
             <a:r>
               <a:rPr lang="en-IE" sz="2400" b="0" dirty="0">
@@ -5867,7 +5875,7 @@
                 <a:latin typeface="Arial"/>
                 <a:cs typeface="Arial"/>
               </a:rPr>
-              <a:t>difference in the mean </a:t>
+              <a:t>difference in the mean of  the </a:t>
             </a:r>
             <a:r>
               <a:rPr lang="en-IE" sz="2400" b="0" dirty="0">
@@ -5901,7 +5909,7 @@
                 <a:ea typeface="Calibri" panose="020F0502020204030204" pitchFamily="34" charset="0"/>
                 <a:cs typeface="Times New Roman"/>
               </a:rPr>
-              <a:t>We</a:t>
+              <a:t>We </a:t>
             </a:r>
             <a:br>
               <a:rPr lang="en-IE" sz="2400" b="0" dirty="0">
@@ -5924,225 +5932,6 @@
                 <a:srgbClr val="FF0000"/>
               </a:solidFill>
             </a:endParaRPr>
-          </a:p>
-        </p:txBody>
-      </p:sp>
-      <p:sp>
-        <p:nvSpPr>
-          <p:cNvPr id="7" name="TextBox 6">
-            <a:extLst>
-              <a:ext uri="{FF2B5EF4-FFF2-40B4-BE49-F238E27FC236}">
-                <a16:creationId xmlns:a16="http://schemas.microsoft.com/office/drawing/2014/main" id="{F7FEA660-7B39-BC91-3B96-7298CCF66DE1}"/>
-              </a:ext>
-            </a:extLst>
-          </p:cNvPr>
-          <p:cNvSpPr txBox="1"/>
-          <p:nvPr/>
-        </p:nvSpPr>
-        <p:spPr>
-          <a:xfrm>
-            <a:off x="623945" y="5297755"/>
-            <a:ext cx="11440040" cy="1477328"/>
-          </a:xfrm>
-          <a:prstGeom prst="rect">
-            <a:avLst/>
-          </a:prstGeom>
-          <a:solidFill>
-            <a:schemeClr val="bg1">
-              <a:lumMod val="95000"/>
-            </a:schemeClr>
-          </a:solidFill>
-        </p:spPr>
-        <p:txBody>
-          <a:bodyPr wrap="square" lIns="91440" tIns="45720" rIns="91440" bIns="45720" rtlCol="0" anchor="t">
-            <a:spAutoFit/>
-          </a:bodyPr>
-          <a:lstStyle/>
-          <a:p>
-            <a:r>
-              <a:rPr lang="en-GB" baseline="30000" dirty="0"/>
-              <a:t>1</a:t>
-            </a:r>
-            <a:r>
-              <a:rPr lang="en-GB" b="1" dirty="0">
-                <a:latin typeface="Calibri"/>
-                <a:cs typeface="Calibri"/>
-              </a:rPr>
-              <a:t>Correlation</a:t>
-            </a:r>
-            <a:r>
-              <a:rPr lang="en-GB" dirty="0"/>
-              <a:t> (</a:t>
-            </a:r>
-            <a:r>
-              <a:rPr lang="en-IE" sz="1800" dirty="0">
-                <a:effectLst/>
-                <a:latin typeface="Calibri"/>
-                <a:ea typeface="Calibri" panose="020F0502020204030204" pitchFamily="34" charset="0"/>
-                <a:cs typeface="Times New Roman"/>
-              </a:rPr>
-              <a:t>Analysis of how </a:t>
-            </a:r>
-            <a:r>
-              <a:rPr lang="en-IE" sz="1800" dirty="0">
-                <a:solidFill>
-                  <a:srgbClr val="FF0000"/>
-                </a:solidFill>
-                <a:effectLst/>
-                <a:latin typeface="Calibri"/>
-                <a:ea typeface="Calibri" panose="020F0502020204030204" pitchFamily="34" charset="0"/>
-                <a:cs typeface="Times New Roman"/>
-              </a:rPr>
-              <a:t>ordinal</a:t>
-            </a:r>
-            <a:r>
-              <a:rPr lang="en-IE" dirty="0">
-                <a:solidFill>
-                  <a:srgbClr val="FF0000"/>
-                </a:solidFill>
-                <a:latin typeface="Calibri"/>
-                <a:ea typeface="Calibri" panose="020F0502020204030204" pitchFamily="34" charset="0"/>
-                <a:cs typeface="Times New Roman"/>
-              </a:rPr>
-              <a:t>/</a:t>
-            </a:r>
-            <a:r>
-              <a:rPr lang="en-IE" sz="1800" dirty="0">
-                <a:solidFill>
-                  <a:srgbClr val="FF0000"/>
-                </a:solidFill>
-                <a:effectLst/>
-                <a:latin typeface="Calibri"/>
-                <a:ea typeface="Calibri" panose="020F0502020204030204" pitchFamily="34" charset="0"/>
-                <a:cs typeface="Times New Roman"/>
-              </a:rPr>
-              <a:t>interval </a:t>
-            </a:r>
-            <a:r>
-              <a:rPr lang="en-IE" sz="1800" dirty="0">
-                <a:solidFill>
-                  <a:srgbClr val="00B050"/>
-                </a:solidFill>
-                <a:effectLst/>
-                <a:latin typeface="Calibri"/>
-                <a:ea typeface="Calibri" panose="020F0502020204030204" pitchFamily="34" charset="0"/>
-                <a:cs typeface="Times New Roman"/>
-              </a:rPr>
-              <a:t>dependent var</a:t>
-            </a:r>
-            <a:r>
-              <a:rPr lang="en-IE" sz="1800" dirty="0">
-                <a:effectLst/>
-                <a:latin typeface="Calibri"/>
-                <a:ea typeface="Calibri" panose="020F0502020204030204" pitchFamily="34" charset="0"/>
-                <a:cs typeface="Times New Roman"/>
-              </a:rPr>
-              <a:t> </a:t>
-            </a:r>
-            <a:r>
-              <a:rPr lang="en-IE" dirty="0">
-                <a:latin typeface="Calibri"/>
-                <a:ea typeface="Calibri" panose="020F0502020204030204" pitchFamily="34" charset="0"/>
-                <a:cs typeface="Times New Roman"/>
-              </a:rPr>
-              <a:t>correlates </a:t>
-            </a:r>
-            <a:r>
-              <a:rPr lang="en-IE" sz="1800" dirty="0">
-                <a:effectLst/>
-                <a:latin typeface="Calibri"/>
-                <a:ea typeface="Calibri" panose="020F0502020204030204" pitchFamily="34" charset="0"/>
-                <a:cs typeface="Times New Roman"/>
-              </a:rPr>
-              <a:t>to an </a:t>
-            </a:r>
-            <a:r>
-              <a:rPr lang="en-IE" sz="1800" dirty="0">
-                <a:solidFill>
-                  <a:srgbClr val="FF0000"/>
-                </a:solidFill>
-                <a:effectLst/>
-                <a:latin typeface="Calibri"/>
-                <a:ea typeface="Calibri" panose="020F0502020204030204" pitchFamily="34" charset="0"/>
-                <a:cs typeface="Times New Roman"/>
-              </a:rPr>
-              <a:t>ordinal/interval </a:t>
-            </a:r>
-            <a:r>
-              <a:rPr lang="en-IE" sz="1800" dirty="0">
-                <a:solidFill>
-                  <a:srgbClr val="00B050"/>
-                </a:solidFill>
-                <a:effectLst/>
-                <a:latin typeface="Calibri"/>
-                <a:ea typeface="Calibri" panose="020F0502020204030204" pitchFamily="34" charset="0"/>
-                <a:cs typeface="Times New Roman"/>
-              </a:rPr>
-              <a:t>independent variable)</a:t>
-            </a:r>
-            <a:endParaRPr lang="en-GB" dirty="0">
-              <a:latin typeface="Calibri"/>
-              <a:cs typeface="Times New Roman"/>
-            </a:endParaRPr>
-          </a:p>
-          <a:p>
-            <a:r>
-              <a:rPr lang="en-IE" sz="1800" b="1" baseline="30000" dirty="0">
-                <a:effectLst/>
-                <a:latin typeface="Calibri" panose="020F0502020204030204" pitchFamily="34" charset="0"/>
-                <a:ea typeface="Calibri" panose="020F0502020204030204" pitchFamily="34" charset="0"/>
-                <a:cs typeface="Times New Roman" panose="02020603050405020304" pitchFamily="18" charset="0"/>
-              </a:rPr>
-              <a:t>2</a:t>
-            </a:r>
-            <a:r>
-              <a:rPr lang="en-IE" sz="1800" b="1" dirty="0">
-                <a:effectLst/>
-                <a:latin typeface="Calibri" panose="020F0502020204030204" pitchFamily="34" charset="0"/>
-                <a:ea typeface="Calibri" panose="020F0502020204030204" pitchFamily="34" charset="0"/>
-                <a:cs typeface="Times New Roman" panose="02020603050405020304" pitchFamily="18" charset="0"/>
-              </a:rPr>
-              <a:t>Comparison of means</a:t>
-            </a:r>
-            <a:r>
-              <a:rPr lang="en-IE" sz="1800" dirty="0">
-                <a:effectLst/>
-                <a:latin typeface="Calibri" panose="020F0502020204030204" pitchFamily="34" charset="0"/>
-                <a:ea typeface="Calibri" panose="020F0502020204030204" pitchFamily="34" charset="0"/>
-                <a:cs typeface="Times New Roman" panose="02020603050405020304" pitchFamily="18" charset="0"/>
-              </a:rPr>
-              <a:t> (or medians): Analysis of the difference between the mean (or median) value of a characteristic shared by members of two different populations.</a:t>
-            </a:r>
-          </a:p>
-          <a:p>
-            <a:r>
-              <a:rPr lang="en-IE" sz="1800" b="1" baseline="30000" dirty="0">
-                <a:effectLst/>
-                <a:latin typeface="Calibri" panose="020F0502020204030204" pitchFamily="34" charset="0"/>
-                <a:ea typeface="Calibri" panose="020F0502020204030204" pitchFamily="34" charset="0"/>
-                <a:cs typeface="Times New Roman" panose="02020603050405020304" pitchFamily="18" charset="0"/>
-              </a:rPr>
-              <a:t>3</a:t>
-            </a:r>
-            <a:r>
-              <a:rPr lang="en-IE" sz="1800" b="1" dirty="0">
-                <a:effectLst/>
-                <a:latin typeface="Calibri" panose="020F0502020204030204" pitchFamily="34" charset="0"/>
-                <a:ea typeface="Calibri" panose="020F0502020204030204" pitchFamily="34" charset="0"/>
-                <a:cs typeface="Times New Roman" panose="02020603050405020304" pitchFamily="18" charset="0"/>
-              </a:rPr>
-              <a:t>Comparison of proportions:</a:t>
-            </a:r>
-            <a:r>
-              <a:rPr lang="en-IE" sz="1800" dirty="0">
-                <a:effectLst/>
-                <a:latin typeface="Calibri" panose="020F0502020204030204" pitchFamily="34" charset="0"/>
-                <a:ea typeface="Calibri" panose="020F0502020204030204" pitchFamily="34" charset="0"/>
-                <a:cs typeface="Times New Roman" panose="02020603050405020304" pitchFamily="18" charset="0"/>
-              </a:rPr>
-              <a:t> Analysis of the difference in proportions of a characteristic shared by members of two different populations. </a:t>
-            </a:r>
-            <a:endParaRPr lang="en-GB" dirty="0"/>
           </a:p>
         </p:txBody>
       </p:sp>
@@ -7011,11 +6800,12 @@
 </file>
 
 <file path=customXml/item1.xml><?xml version="1.0" encoding="utf-8"?>
-<p:properties xmlns:p="http://schemas.microsoft.com/office/2006/metadata/properties" xmlns:xsi="http://www.w3.org/2001/XMLSchema-instance" xmlns:pc="http://schemas.microsoft.com/office/infopath/2007/PartnerControls">
-  <documentManagement>
-    <Information xmlns="4ad138b4-2b68-4b70-945d-07f8f18b1c9a" xsi:nil="true"/>
-  </documentManagement>
-</p:properties>
+<?mso-contentType ?>
+<FormTemplates xmlns="http://schemas.microsoft.com/sharepoint/v3/contenttype/forms">
+  <Display>DocumentLibraryForm</Display>
+  <Edit>DocumentLibraryForm</Edit>
+  <New>DocumentLibraryForm</New>
+</FormTemplates>
 </file>
 
 <file path=customXml/item2.xml><?xml version="1.0" encoding="utf-8"?>
@@ -7244,27 +7034,17 @@
 </file>
 
 <file path=customXml/item3.xml><?xml version="1.0" encoding="utf-8"?>
-<?mso-contentType ?>
-<FormTemplates xmlns="http://schemas.microsoft.com/sharepoint/v3/contenttype/forms">
-  <Display>DocumentLibraryForm</Display>
-  <Edit>DocumentLibraryForm</Edit>
-  <New>DocumentLibraryForm</New>
-</FormTemplates>
+<p:properties xmlns:p="http://schemas.microsoft.com/office/2006/metadata/properties" xmlns:xsi="http://www.w3.org/2001/XMLSchema-instance" xmlns:pc="http://schemas.microsoft.com/office/infopath/2007/PartnerControls">
+  <documentManagement>
+    <Information xmlns="4ad138b4-2b68-4b70-945d-07f8f18b1c9a" xsi:nil="true"/>
+  </documentManagement>
+</p:properties>
 </file>
 
 <file path=customXml/itemProps1.xml><?xml version="1.0" encoding="utf-8"?>
-<ds:datastoreItem xmlns:ds="http://schemas.openxmlformats.org/officeDocument/2006/customXml" ds:itemID="{EDD1FC41-23C7-41B0-B5F9-BF4CD38AD2ED}">
+<ds:datastoreItem xmlns:ds="http://schemas.openxmlformats.org/officeDocument/2006/customXml" ds:itemID="{91C521DD-2673-4EE6-BB9B-DC5C3320FFBB}">
   <ds:schemaRefs>
-    <ds:schemaRef ds:uri="3c474641-ec36-472f-b125-6b1b0910eaa4"/>
-    <ds:schemaRef ds:uri="4ad138b4-2b68-4b70-945d-07f8f18b1c9a"/>
-    <ds:schemaRef ds:uri="http://purl.org/dc/dcmitype/"/>
-    <ds:schemaRef ds:uri="http://purl.org/dc/elements/1.1/"/>
-    <ds:schemaRef ds:uri="http://purl.org/dc/terms/"/>
-    <ds:schemaRef ds:uri="http://schemas.microsoft.com/office/2006/documentManagement/types"/>
-    <ds:schemaRef ds:uri="http://schemas.microsoft.com/office/2006/metadata/properties"/>
-    <ds:schemaRef ds:uri="http://schemas.microsoft.com/office/infopath/2007/PartnerControls"/>
-    <ds:schemaRef ds:uri="http://schemas.openxmlformats.org/package/2006/metadata/core-properties"/>
-    <ds:schemaRef ds:uri="http://www.w3.org/XML/1998/namespace"/>
+    <ds:schemaRef ds:uri="http://schemas.microsoft.com/sharepoint/v3/contenttype/forms"/>
   </ds:schemaRefs>
 </ds:datastoreItem>
 </file>
@@ -7289,9 +7069,18 @@
 </file>
 
 <file path=customXml/itemProps3.xml><?xml version="1.0" encoding="utf-8"?>
-<ds:datastoreItem xmlns:ds="http://schemas.openxmlformats.org/officeDocument/2006/customXml" ds:itemID="{91C521DD-2673-4EE6-BB9B-DC5C3320FFBB}">
+<ds:datastoreItem xmlns:ds="http://schemas.openxmlformats.org/officeDocument/2006/customXml" ds:itemID="{EDD1FC41-23C7-41B0-B5F9-BF4CD38AD2ED}">
   <ds:schemaRefs>
-    <ds:schemaRef ds:uri="http://schemas.microsoft.com/sharepoint/v3/contenttype/forms"/>
+    <ds:schemaRef ds:uri="3c474641-ec36-472f-b125-6b1b0910eaa4"/>
+    <ds:schemaRef ds:uri="4ad138b4-2b68-4b70-945d-07f8f18b1c9a"/>
+    <ds:schemaRef ds:uri="http://purl.org/dc/dcmitype/"/>
+    <ds:schemaRef ds:uri="http://purl.org/dc/elements/1.1/"/>
+    <ds:schemaRef ds:uri="http://purl.org/dc/terms/"/>
+    <ds:schemaRef ds:uri="http://schemas.microsoft.com/office/2006/documentManagement/types"/>
+    <ds:schemaRef ds:uri="http://schemas.microsoft.com/office/2006/metadata/properties"/>
+    <ds:schemaRef ds:uri="http://schemas.microsoft.com/office/infopath/2007/PartnerControls"/>
+    <ds:schemaRef ds:uri="http://schemas.openxmlformats.org/package/2006/metadata/core-properties"/>
+    <ds:schemaRef ds:uri="http://www.w3.org/XML/1998/namespace"/>
   </ds:schemaRefs>
 </ds:datastoreItem>
 </file>
</xml_diff>

<commit_message>
made changes in 1&4 slides
</commit_message>
<xml_diff>
--- a/research_question.ppt.pptx
+++ b/research_question.ppt.pptx
@@ -254,7 +254,7 @@
             <a:fld id="{93FAAC3A-BD1F-4A00-9099-74B95789FE00}" type="datetimeFigureOut">
               <a:rPr lang="en-GB" smtClean="0"/>
               <a:pPr/>
-              <a:t>01/12/2025</a:t>
+              <a:t>30/11/2025</a:t>
             </a:fld>
             <a:endParaRPr lang="en-GB"/>
           </a:p>
@@ -433,7 +433,7 @@
             <a:fld id="{8E359C8A-39F6-4045-9163-4042C4C26B15}" type="datetimeFigureOut">
               <a:rPr lang="en-GB" smtClean="0"/>
               <a:pPr/>
-              <a:t>01/12/2025</a:t>
+              <a:t>30/11/2025</a:t>
             </a:fld>
             <a:endParaRPr lang="en-GB"/>
           </a:p>
@@ -4806,7 +4806,7 @@
             </a:br>
             <a:r>
               <a:rPr lang="en-US" sz="2200" dirty="0"/>
-              <a:t>Date: </a:t>
+              <a:t>Date: 1/12/2025</a:t>
             </a:r>
             <a:br>
               <a:rPr lang="en-US" sz="8000" dirty="0"/>
@@ -4838,7 +4838,7 @@
           <a:p>
             <a:r>
               <a:rPr lang="en-US" sz="2000" dirty="0"/>
-              <a:t>Group Name:                                                            Name of Student Presenting:</a:t>
+              <a:t>Group Name: Group A 196                                                           Name of Student Presenting:</a:t>
             </a:r>
           </a:p>
         </p:txBody>
@@ -4871,7 +4871,15 @@
           <a:p>
             <a:r>
               <a:rPr lang="en-GB" dirty="0"/>
-              <a:t>7COM1079-2025  Student Group No:  Group A 196                  Names of Student Attendees : Gourav Kamble, Shrinidhi G, Britto George Fernandez, Kavya </a:t>
+              <a:t>7COM1079-2025  Student Group No:  Group A 196                  Names of Student Attendees : Gourav Kamble, </a:t>
+            </a:r>
+            <a:r>
+              <a:rPr lang="en-GB" dirty="0" err="1"/>
+              <a:t>Shrinidhi</a:t>
+            </a:r>
+            <a:r>
+              <a:rPr lang="en-GB" dirty="0"/>
+              <a:t> Gowda Girish, Britto George Fernandez, Kavya </a:t>
             </a:r>
             <a:r>
               <a:rPr lang="en-GB" dirty="0" err="1"/>
@@ -5341,7 +5349,7 @@
             </a:r>
             <a:r>
               <a:rPr lang="en-GB" dirty="0"/>
-              <a:t> , Britto      George Fernandez, Kavya </a:t>
+              <a:t> Gowda Girish , Britto George Fernandez, Kavya </a:t>
             </a:r>
             <a:r>
               <a:rPr lang="en-GB" dirty="0" err="1"/>
@@ -5654,7 +5662,7 @@
         </p:nvSpPr>
         <p:spPr>
           <a:xfrm>
-            <a:off x="10616400" y="791022"/>
+            <a:off x="10616400" y="810072"/>
             <a:ext cx="622800" cy="230832"/>
           </a:xfrm>
         </p:spPr>
@@ -5909,8 +5917,178 @@
                 <a:ea typeface="Calibri" panose="020F0502020204030204" pitchFamily="34" charset="0"/>
                 <a:cs typeface="Times New Roman"/>
               </a:rPr>
-              <a:t>We </a:t>
-            </a:r>
+              <a:t>We  reject the null hypothesis (p = 4.22x10 </a:t>
+            </a:r>
+            <a:r>
+              <a:rPr lang="en-IE" sz="2400" b="0" baseline="30000" dirty="0">
+                <a:effectLst/>
+                <a:latin typeface="Calibri"/>
+                <a:ea typeface="Calibri" panose="020F0502020204030204" pitchFamily="34" charset="0"/>
+                <a:cs typeface="Times New Roman"/>
+              </a:rPr>
+              <a:t>-42 </a:t>
+            </a:r>
+            <a:r>
+              <a:rPr lang="en-IE" sz="2400" b="0" dirty="0">
+                <a:effectLst/>
+                <a:latin typeface="Calibri"/>
+                <a:ea typeface="Calibri" panose="020F0502020204030204" pitchFamily="34" charset="0"/>
+                <a:cs typeface="Times New Roman"/>
+              </a:rPr>
+              <a:t>) , confirming a significant difference by gender.</a:t>
+            </a:r>
+            <a:br>
+              <a:rPr lang="en-IE" sz="2400" b="0" dirty="0">
+                <a:effectLst/>
+                <a:latin typeface="Calibri"/>
+                <a:ea typeface="Calibri" panose="020F0502020204030204" pitchFamily="34" charset="0"/>
+                <a:cs typeface="Times New Roman"/>
+              </a:rPr>
+            </a:br>
+            <a:br>
+              <a:rPr lang="en-IE" sz="2400" b="0" dirty="0">
+                <a:effectLst/>
+                <a:latin typeface="Calibri"/>
+                <a:ea typeface="Calibri" panose="020F0502020204030204" pitchFamily="34" charset="0"/>
+                <a:cs typeface="Times New Roman"/>
+              </a:rPr>
+            </a:br>
+            <a:br>
+              <a:rPr lang="en-IE" sz="2400" b="0" dirty="0">
+                <a:effectLst/>
+                <a:latin typeface="Calibri"/>
+                <a:ea typeface="Calibri" panose="020F0502020204030204" pitchFamily="34" charset="0"/>
+                <a:cs typeface="Times New Roman"/>
+              </a:rPr>
+            </a:br>
+            <a:br>
+              <a:rPr lang="en-IE" sz="2400" b="0" dirty="0">
+                <a:effectLst/>
+                <a:latin typeface="Calibri"/>
+                <a:ea typeface="Calibri" panose="020F0502020204030204" pitchFamily="34" charset="0"/>
+                <a:cs typeface="Times New Roman"/>
+              </a:rPr>
+            </a:br>
+            <a:br>
+              <a:rPr lang="en-IE" sz="2400" b="0" dirty="0">
+                <a:effectLst/>
+                <a:latin typeface="Calibri"/>
+                <a:ea typeface="Calibri" panose="020F0502020204030204" pitchFamily="34" charset="0"/>
+                <a:cs typeface="Times New Roman"/>
+              </a:rPr>
+            </a:br>
+            <a:br>
+              <a:rPr lang="en-IE" sz="2400" b="0" dirty="0">
+                <a:effectLst/>
+                <a:latin typeface="Calibri"/>
+                <a:ea typeface="Calibri" panose="020F0502020204030204" pitchFamily="34" charset="0"/>
+                <a:cs typeface="Times New Roman"/>
+              </a:rPr>
+            </a:br>
+            <a:br>
+              <a:rPr lang="en-IE" sz="2400" b="0" dirty="0">
+                <a:effectLst/>
+                <a:latin typeface="Calibri"/>
+                <a:ea typeface="Calibri" panose="020F0502020204030204" pitchFamily="34" charset="0"/>
+                <a:cs typeface="Times New Roman"/>
+              </a:rPr>
+            </a:br>
+            <a:br>
+              <a:rPr lang="en-IE" sz="2400" b="0" dirty="0">
+                <a:effectLst/>
+                <a:latin typeface="Calibri"/>
+                <a:ea typeface="Calibri" panose="020F0502020204030204" pitchFamily="34" charset="0"/>
+                <a:cs typeface="Times New Roman"/>
+              </a:rPr>
+            </a:br>
+            <a:br>
+              <a:rPr lang="en-IE" sz="2400" b="0" dirty="0">
+                <a:effectLst/>
+                <a:latin typeface="Calibri"/>
+                <a:ea typeface="Calibri" panose="020F0502020204030204" pitchFamily="34" charset="0"/>
+                <a:cs typeface="Times New Roman"/>
+              </a:rPr>
+            </a:br>
+            <a:br>
+              <a:rPr lang="en-IE" sz="2400" b="0" dirty="0">
+                <a:effectLst/>
+                <a:latin typeface="Calibri"/>
+                <a:ea typeface="Calibri" panose="020F0502020204030204" pitchFamily="34" charset="0"/>
+                <a:cs typeface="Times New Roman"/>
+              </a:rPr>
+            </a:br>
+            <a:br>
+              <a:rPr lang="en-IE" sz="2400" b="0" dirty="0">
+                <a:effectLst/>
+                <a:latin typeface="Calibri"/>
+                <a:ea typeface="Calibri" panose="020F0502020204030204" pitchFamily="34" charset="0"/>
+                <a:cs typeface="Times New Roman"/>
+              </a:rPr>
+            </a:br>
+            <a:br>
+              <a:rPr lang="en-IE" sz="2400" b="0" dirty="0">
+                <a:effectLst/>
+                <a:latin typeface="Calibri"/>
+                <a:ea typeface="Calibri" panose="020F0502020204030204" pitchFamily="34" charset="0"/>
+                <a:cs typeface="Times New Roman"/>
+              </a:rPr>
+            </a:br>
+            <a:br>
+              <a:rPr lang="en-IE" sz="2400" b="0" dirty="0">
+                <a:effectLst/>
+                <a:latin typeface="Calibri"/>
+                <a:ea typeface="Calibri" panose="020F0502020204030204" pitchFamily="34" charset="0"/>
+                <a:cs typeface="Times New Roman"/>
+              </a:rPr>
+            </a:br>
+            <a:br>
+              <a:rPr lang="en-IE" sz="2400" b="0" dirty="0">
+                <a:effectLst/>
+                <a:latin typeface="Calibri"/>
+                <a:ea typeface="Calibri" panose="020F0502020204030204" pitchFamily="34" charset="0"/>
+                <a:cs typeface="Times New Roman"/>
+              </a:rPr>
+            </a:br>
+            <a:br>
+              <a:rPr lang="en-IE" sz="2400" b="0" dirty="0">
+                <a:effectLst/>
+                <a:latin typeface="Calibri"/>
+                <a:ea typeface="Calibri" panose="020F0502020204030204" pitchFamily="34" charset="0"/>
+                <a:cs typeface="Times New Roman"/>
+              </a:rPr>
+            </a:br>
+            <a:br>
+              <a:rPr lang="en-IE" sz="2400" b="0" dirty="0">
+                <a:effectLst/>
+                <a:latin typeface="Calibri"/>
+                <a:ea typeface="Calibri" panose="020F0502020204030204" pitchFamily="34" charset="0"/>
+                <a:cs typeface="Times New Roman"/>
+              </a:rPr>
+            </a:br>
+            <a:br>
+              <a:rPr lang="en-IE" sz="2400" b="0" dirty="0">
+                <a:effectLst/>
+                <a:latin typeface="Calibri"/>
+                <a:ea typeface="Calibri" panose="020F0502020204030204" pitchFamily="34" charset="0"/>
+                <a:cs typeface="Times New Roman"/>
+              </a:rPr>
+            </a:br>
+            <a:br>
+              <a:rPr lang="en-IE" sz="2400" b="0" dirty="0">
+                <a:effectLst/>
+                <a:latin typeface="Calibri"/>
+                <a:ea typeface="Calibri" panose="020F0502020204030204" pitchFamily="34" charset="0"/>
+                <a:cs typeface="Times New Roman"/>
+              </a:rPr>
+            </a:br>
+            <a:br>
+              <a:rPr lang="en-IE" sz="2400" b="0" dirty="0">
+                <a:effectLst/>
+                <a:latin typeface="Calibri"/>
+                <a:ea typeface="Calibri" panose="020F0502020204030204" pitchFamily="34" charset="0"/>
+                <a:cs typeface="Times New Roman"/>
+              </a:rPr>
+            </a:br>
             <a:br>
               <a:rPr lang="en-IE" sz="2400" b="0" dirty="0">
                 <a:effectLst/>
@@ -6800,12 +6978,11 @@
 </file>
 
 <file path=customXml/item1.xml><?xml version="1.0" encoding="utf-8"?>
-<?mso-contentType ?>
-<FormTemplates xmlns="http://schemas.microsoft.com/sharepoint/v3/contenttype/forms">
-  <Display>DocumentLibraryForm</Display>
-  <Edit>DocumentLibraryForm</Edit>
-  <New>DocumentLibraryForm</New>
-</FormTemplates>
+<p:properties xmlns:p="http://schemas.microsoft.com/office/2006/metadata/properties" xmlns:xsi="http://www.w3.org/2001/XMLSchema-instance" xmlns:pc="http://schemas.microsoft.com/office/infopath/2007/PartnerControls">
+  <documentManagement>
+    <Information xmlns="4ad138b4-2b68-4b70-945d-07f8f18b1c9a" xsi:nil="true"/>
+  </documentManagement>
+</p:properties>
 </file>
 
 <file path=customXml/item2.xml><?xml version="1.0" encoding="utf-8"?>
@@ -7034,17 +7211,27 @@
 </file>
 
 <file path=customXml/item3.xml><?xml version="1.0" encoding="utf-8"?>
-<p:properties xmlns:p="http://schemas.microsoft.com/office/2006/metadata/properties" xmlns:xsi="http://www.w3.org/2001/XMLSchema-instance" xmlns:pc="http://schemas.microsoft.com/office/infopath/2007/PartnerControls">
-  <documentManagement>
-    <Information xmlns="4ad138b4-2b68-4b70-945d-07f8f18b1c9a" xsi:nil="true"/>
-  </documentManagement>
-</p:properties>
+<?mso-contentType ?>
+<FormTemplates xmlns="http://schemas.microsoft.com/sharepoint/v3/contenttype/forms">
+  <Display>DocumentLibraryForm</Display>
+  <Edit>DocumentLibraryForm</Edit>
+  <New>DocumentLibraryForm</New>
+</FormTemplates>
 </file>
 
 <file path=customXml/itemProps1.xml><?xml version="1.0" encoding="utf-8"?>
-<ds:datastoreItem xmlns:ds="http://schemas.openxmlformats.org/officeDocument/2006/customXml" ds:itemID="{91C521DD-2673-4EE6-BB9B-DC5C3320FFBB}">
+<ds:datastoreItem xmlns:ds="http://schemas.openxmlformats.org/officeDocument/2006/customXml" ds:itemID="{EDD1FC41-23C7-41B0-B5F9-BF4CD38AD2ED}">
   <ds:schemaRefs>
-    <ds:schemaRef ds:uri="http://schemas.microsoft.com/sharepoint/v3/contenttype/forms"/>
+    <ds:schemaRef ds:uri="3c474641-ec36-472f-b125-6b1b0910eaa4"/>
+    <ds:schemaRef ds:uri="4ad138b4-2b68-4b70-945d-07f8f18b1c9a"/>
+    <ds:schemaRef ds:uri="http://purl.org/dc/dcmitype/"/>
+    <ds:schemaRef ds:uri="http://purl.org/dc/elements/1.1/"/>
+    <ds:schemaRef ds:uri="http://purl.org/dc/terms/"/>
+    <ds:schemaRef ds:uri="http://schemas.microsoft.com/office/2006/documentManagement/types"/>
+    <ds:schemaRef ds:uri="http://schemas.microsoft.com/office/2006/metadata/properties"/>
+    <ds:schemaRef ds:uri="http://schemas.microsoft.com/office/infopath/2007/PartnerControls"/>
+    <ds:schemaRef ds:uri="http://schemas.openxmlformats.org/package/2006/metadata/core-properties"/>
+    <ds:schemaRef ds:uri="http://www.w3.org/XML/1998/namespace"/>
   </ds:schemaRefs>
 </ds:datastoreItem>
 </file>
@@ -7069,18 +7256,9 @@
 </file>
 
 <file path=customXml/itemProps3.xml><?xml version="1.0" encoding="utf-8"?>
-<ds:datastoreItem xmlns:ds="http://schemas.openxmlformats.org/officeDocument/2006/customXml" ds:itemID="{EDD1FC41-23C7-41B0-B5F9-BF4CD38AD2ED}">
+<ds:datastoreItem xmlns:ds="http://schemas.openxmlformats.org/officeDocument/2006/customXml" ds:itemID="{91C521DD-2673-4EE6-BB9B-DC5C3320FFBB}">
   <ds:schemaRefs>
-    <ds:schemaRef ds:uri="3c474641-ec36-472f-b125-6b1b0910eaa4"/>
-    <ds:schemaRef ds:uri="4ad138b4-2b68-4b70-945d-07f8f18b1c9a"/>
-    <ds:schemaRef ds:uri="http://purl.org/dc/dcmitype/"/>
-    <ds:schemaRef ds:uri="http://purl.org/dc/elements/1.1/"/>
-    <ds:schemaRef ds:uri="http://purl.org/dc/terms/"/>
-    <ds:schemaRef ds:uri="http://schemas.microsoft.com/office/2006/documentManagement/types"/>
-    <ds:schemaRef ds:uri="http://schemas.microsoft.com/office/2006/metadata/properties"/>
-    <ds:schemaRef ds:uri="http://schemas.microsoft.com/office/infopath/2007/PartnerControls"/>
-    <ds:schemaRef ds:uri="http://schemas.openxmlformats.org/package/2006/metadata/core-properties"/>
-    <ds:schemaRef ds:uri="http://www.w3.org/XML/1998/namespace"/>
+    <ds:schemaRef ds:uri="http://schemas.microsoft.com/sharepoint/v3/contenttype/forms"/>
   </ds:schemaRefs>
 </ds:datastoreItem>
 </file>
</xml_diff>

<commit_message>
The PPT ready for final presentation
</commit_message>
<xml_diff>
--- a/research_question.ppt.pptx
+++ b/research_question.ppt.pptx
@@ -254,7 +254,7 @@
             <a:fld id="{93FAAC3A-BD1F-4A00-9099-74B95789FE00}" type="datetimeFigureOut">
               <a:rPr lang="en-GB" smtClean="0"/>
               <a:pPr/>
-              <a:t>30/11/2025</a:t>
+              <a:t>01/12/2025</a:t>
             </a:fld>
             <a:endParaRPr lang="en-GB"/>
           </a:p>
@@ -433,7 +433,7 @@
             <a:fld id="{8E359C8A-39F6-4045-9163-4042C4C26B15}" type="datetimeFigureOut">
               <a:rPr lang="en-GB" smtClean="0"/>
               <a:pPr/>
-              <a:t>30/11/2025</a:t>
+              <a:t>01/12/2025</a:t>
             </a:fld>
             <a:endParaRPr lang="en-GB"/>
           </a:p>
@@ -4831,14 +4831,19 @@
             <p:ph type="subTitle" idx="1"/>
           </p:nvPr>
         </p:nvSpPr>
-        <p:spPr/>
+        <p:spPr>
+          <a:xfrm>
+            <a:off x="737419" y="1890000"/>
+            <a:ext cx="11218607" cy="360000"/>
+          </a:xfrm>
+        </p:spPr>
         <p:txBody>
           <a:bodyPr/>
           <a:lstStyle/>
           <a:p>
             <a:r>
               <a:rPr lang="en-US" sz="2000" dirty="0"/>
-              <a:t>Group Name: Group A 196                                                           Name of Student Presenting:</a:t>
+              <a:t>Group Name: Group A 196                                               Name of Student Presenting: Gaurav Kamble</a:t>
             </a:r>
           </a:p>
         </p:txBody>
@@ -4869,17 +4874,10 @@
           <a:bodyPr/>
           <a:lstStyle/>
           <a:p>
+            <a:pPr algn="r"/>
             <a:r>
               <a:rPr lang="en-GB" dirty="0"/>
-              <a:t>7COM1079-2025  Student Group No:  Group A 196                  Names of Student Attendees : Gourav Kamble, </a:t>
-            </a:r>
-            <a:r>
-              <a:rPr lang="en-GB" dirty="0" err="1"/>
-              <a:t>Shrinidhi</a:t>
-            </a:r>
-            <a:r>
-              <a:rPr lang="en-GB" dirty="0"/>
-              <a:t> Gowda Girish, Britto George Fernandez, Kavya </a:t>
+              <a:t>7COM1079-2025  Student Group No:  Group A 196                  Names of Student Attendees : Gaurav Chandrakant Kamble, Shrinidhi Gowda Girish, Britto George Fernandez, Kavya </a:t>
             </a:r>
             <a:r>
               <a:rPr lang="en-GB" dirty="0" err="1"/>
@@ -5008,7 +5006,15 @@
           <a:p>
             <a:r>
               <a:rPr lang="en-GB" dirty="0"/>
-              <a:t>PRE 7COM1079-2025  Student Group No:  Group A 196</a:t>
+              <a:t>PRE 7COM1079-2025  Student Group </a:t>
+            </a:r>
+            <a:r>
+              <a:rPr lang="en-GB" dirty="0" err="1"/>
+              <a:t>No:Group</a:t>
+            </a:r>
+            <a:r>
+              <a:rPr lang="en-GB" dirty="0"/>
+              <a:t> A 196</a:t>
             </a:r>
           </a:p>
         </p:txBody>
@@ -5094,7 +5100,45 @@
                 <a:ea typeface="Calibri" panose="020F0502020204030204" pitchFamily="34" charset="0"/>
                 <a:cs typeface="Calibri" panose="020F0502020204030204" pitchFamily="34" charset="0"/>
               </a:rPr>
-              <a:t>In our research question we will use the Demographic and  Mean Scale Score columns.</a:t>
+              <a:t>In our research question we will use the </a:t>
+            </a:r>
+            <a:r>
+              <a:rPr lang="en-GB" sz="2400" b="0" dirty="0">
+                <a:solidFill>
+                  <a:srgbClr val="FF0000"/>
+                </a:solidFill>
+                <a:latin typeface="Calibri" panose="020F0502020204030204" pitchFamily="34" charset="0"/>
+                <a:ea typeface="Calibri" panose="020F0502020204030204" pitchFamily="34" charset="0"/>
+                <a:cs typeface="Calibri" panose="020F0502020204030204" pitchFamily="34" charset="0"/>
+              </a:rPr>
+              <a:t>Demographic </a:t>
+            </a:r>
+            <a:r>
+              <a:rPr lang="en-GB" sz="2400" b="0" dirty="0">
+                <a:latin typeface="Calibri" panose="020F0502020204030204" pitchFamily="34" charset="0"/>
+                <a:ea typeface="Calibri" panose="020F0502020204030204" pitchFamily="34" charset="0"/>
+                <a:cs typeface="Calibri" panose="020F0502020204030204" pitchFamily="34" charset="0"/>
+              </a:rPr>
+              <a:t>and  </a:t>
+            </a:r>
+            <a:r>
+              <a:rPr lang="en-GB" sz="2400" b="0" dirty="0">
+                <a:solidFill>
+                  <a:srgbClr val="FF0000"/>
+                </a:solidFill>
+                <a:latin typeface="Calibri" panose="020F0502020204030204" pitchFamily="34" charset="0"/>
+                <a:ea typeface="Calibri" panose="020F0502020204030204" pitchFamily="34" charset="0"/>
+                <a:cs typeface="Calibri" panose="020F0502020204030204" pitchFamily="34" charset="0"/>
+              </a:rPr>
+              <a:t>Mean Scale Score </a:t>
+            </a:r>
+            <a:r>
+              <a:rPr lang="en-GB" sz="2400" b="0" dirty="0">
+                <a:latin typeface="Calibri" panose="020F0502020204030204" pitchFamily="34" charset="0"/>
+                <a:ea typeface="Calibri" panose="020F0502020204030204" pitchFamily="34" charset="0"/>
+                <a:cs typeface="Calibri" panose="020F0502020204030204" pitchFamily="34" charset="0"/>
+              </a:rPr>
+              <a:t>columns.</a:t>
             </a:r>
             <a:endParaRPr lang="en-US" sz="2400" b="0" dirty="0">
               <a:latin typeface="Calibri" panose="020F0502020204030204" pitchFamily="34" charset="0"/>
@@ -5122,7 +5166,7 @@
                 <a:ea typeface="Calibri" panose="020F0502020204030204" pitchFamily="34" charset="0"/>
                 <a:cs typeface="Calibri" panose="020F0502020204030204" pitchFamily="34" charset="0"/>
               </a:rPr>
-              <a:t>Sample Dataset </a:t>
+              <a:t>Sample Dataset :</a:t>
             </a:r>
             <a:br>
               <a:rPr lang="en-GB" sz="2400" b="0" dirty="0">
@@ -5185,7 +5229,45 @@
                 <a:ea typeface="Calibri" panose="020F0502020204030204" pitchFamily="34" charset="0"/>
                 <a:cs typeface="Calibri" panose="020F0502020204030204" pitchFamily="34" charset="0"/>
               </a:rPr>
-              <a:t>Tell us how many rows your dataset has 68028 rows and 16 columns.</a:t>
+              <a:t>Rows &amp; Columns dataset has : </a:t>
+            </a:r>
+            <a:r>
+              <a:rPr lang="en-GB" sz="2400" b="0" dirty="0">
+                <a:solidFill>
+                  <a:srgbClr val="FF0000"/>
+                </a:solidFill>
+                <a:latin typeface="Calibri" panose="020F0502020204030204" pitchFamily="34" charset="0"/>
+                <a:ea typeface="Calibri" panose="020F0502020204030204" pitchFamily="34" charset="0"/>
+                <a:cs typeface="Calibri" panose="020F0502020204030204" pitchFamily="34" charset="0"/>
+              </a:rPr>
+              <a:t>68028 rows </a:t>
+            </a:r>
+            <a:r>
+              <a:rPr lang="en-GB" sz="2400" b="0" dirty="0">
+                <a:latin typeface="Calibri" panose="020F0502020204030204" pitchFamily="34" charset="0"/>
+                <a:ea typeface="Calibri" panose="020F0502020204030204" pitchFamily="34" charset="0"/>
+                <a:cs typeface="Calibri" panose="020F0502020204030204" pitchFamily="34" charset="0"/>
+              </a:rPr>
+              <a:t>and </a:t>
+            </a:r>
+            <a:r>
+              <a:rPr lang="en-GB" sz="2400" b="0" dirty="0">
+                <a:solidFill>
+                  <a:srgbClr val="FF0000"/>
+                </a:solidFill>
+                <a:latin typeface="Calibri" panose="020F0502020204030204" pitchFamily="34" charset="0"/>
+                <a:ea typeface="Calibri" panose="020F0502020204030204" pitchFamily="34" charset="0"/>
+                <a:cs typeface="Calibri" panose="020F0502020204030204" pitchFamily="34" charset="0"/>
+              </a:rPr>
+              <a:t>16 columns</a:t>
+            </a:r>
+            <a:r>
+              <a:rPr lang="en-GB" sz="2400" b="0" dirty="0">
+                <a:latin typeface="Calibri" panose="020F0502020204030204" pitchFamily="34" charset="0"/>
+                <a:ea typeface="Calibri" panose="020F0502020204030204" pitchFamily="34" charset="0"/>
+                <a:cs typeface="Calibri" panose="020F0502020204030204" pitchFamily="34" charset="0"/>
+              </a:rPr>
+              <a:t>.</a:t>
             </a:r>
             <a:endParaRPr lang="en-GB" sz="2400" dirty="0">
               <a:latin typeface="Calibri" panose="020F0502020204030204" pitchFamily="34" charset="0"/>
@@ -5216,8 +5298,8 @@
         </p:blipFill>
         <p:spPr>
           <a:xfrm>
-            <a:off x="1434942" y="2571750"/>
-            <a:ext cx="9322116" cy="1543050"/>
+            <a:off x="1434941" y="2571749"/>
+            <a:ext cx="9678535" cy="1820497"/>
           </a:xfrm>
           <a:prstGeom prst="rect">
             <a:avLst/>
@@ -5300,7 +5382,31 @@
                   <a:schemeClr val="tx1"/>
                 </a:solidFill>
               </a:rPr>
-              <a:t>: </a:t>
+              <a:t>:</a:t>
+            </a:r>
+            <a:r>
+              <a:rPr lang="en-US" sz="1600" b="0" dirty="0">
+                <a:solidFill>
+                  <a:schemeClr val="tx1"/>
+                </a:solidFill>
+              </a:rPr>
+              <a:t> </a:t>
+            </a:r>
+            <a:r>
+              <a:rPr lang="en-US" sz="2400" b="0" dirty="0">
+                <a:solidFill>
+                  <a:srgbClr val="FF0000"/>
+                </a:solidFill>
+              </a:rPr>
+              <a:t>DS048</a:t>
+            </a:r>
+            <a:r>
+              <a:rPr lang="en-US" sz="2400" b="0" dirty="0">
+                <a:solidFill>
+                  <a:schemeClr val="tx1"/>
+                </a:solidFill>
+              </a:rPr>
+              <a:t> </a:t>
             </a:r>
             <a:r>
               <a:rPr lang="en-US" sz="2400" dirty="0">
@@ -5308,7 +5414,15 @@
                   <a:schemeClr val="tx1"/>
                 </a:solidFill>
               </a:rPr>
-              <a:t>DS048 and filename: 2006-2012-math-test-results-school-gender-1.csv </a:t>
+              <a:t>and filename: </a:t>
+            </a:r>
+            <a:r>
+              <a:rPr lang="en-US" sz="2400" b="0" dirty="0">
+                <a:solidFill>
+                  <a:srgbClr val="FF0000"/>
+                </a:solidFill>
+              </a:rPr>
+              <a:t>2006-2012-math-test-results-school-gender-1.csv </a:t>
             </a:r>
           </a:p>
         </p:txBody>
@@ -5339,6 +5453,7 @@
           <a:bodyPr/>
           <a:lstStyle/>
           <a:p>
+            <a:pPr algn="r"/>
             <a:r>
               <a:rPr lang="en-GB" dirty="0"/>
               <a:t>7COM1079-2025  Student Group No:A-196                    Names of Student Group Attendees: Gourav Kamble, </a:t>
@@ -5349,15 +5464,7 @@
             </a:r>
             <a:r>
               <a:rPr lang="en-GB" dirty="0"/>
-              <a:t> Gowda Girish , Britto George Fernandez, Kavya </a:t>
-            </a:r>
-            <a:r>
-              <a:rPr lang="en-GB" dirty="0" err="1"/>
-              <a:t>Belur</a:t>
-            </a:r>
-            <a:r>
-              <a:rPr lang="en-GB" dirty="0"/>
-              <a:t> Ramesh </a:t>
+              <a:t> Gowda , Britto Fernandez, Kavya Ramesh </a:t>
             </a:r>
           </a:p>
         </p:txBody>
@@ -5468,10 +5575,30 @@
             </a:br>
             <a:r>
               <a:rPr lang="en-US" sz="2400" b="0" dirty="0">
+                <a:solidFill>
+                  <a:srgbClr val="FF0000"/>
+                </a:solidFill>
                 <a:latin typeface="Calibri"/>
                 <a:cs typeface="Calibri"/>
               </a:rPr>
-              <a:t>Our  Independent variable is:  Demographic</a:t>
+              <a:t>Our  Independent variable is</a:t>
+            </a:r>
+            <a:r>
+              <a:rPr lang="en-US" sz="2400" b="0" dirty="0">
+                <a:latin typeface="Calibri"/>
+                <a:cs typeface="Calibri"/>
+              </a:rPr>
+              <a:t>:  </a:t>
+            </a:r>
+            <a:r>
+              <a:rPr lang="en-US" sz="2400" b="0" dirty="0">
+                <a:solidFill>
+                  <a:srgbClr val="FF0000"/>
+                </a:solidFill>
+                <a:latin typeface="Calibri"/>
+                <a:cs typeface="Calibri"/>
+              </a:rPr>
+              <a:t>Demographic</a:t>
             </a:r>
             <a:br>
               <a:rPr lang="en-US" sz="2400" b="0" dirty="0">
@@ -5494,7 +5621,24 @@
                 <a:latin typeface="Calibri"/>
                 <a:cs typeface="Calibri"/>
               </a:rPr>
-              <a:t>This  Independent variable datatype is Nominal/categorial</a:t>
+              <a:t>This  Independent variable datatype is </a:t>
+            </a:r>
+            <a:r>
+              <a:rPr lang="en-US" sz="2400" b="0" dirty="0">
+                <a:solidFill>
+                  <a:srgbClr val="FF0000"/>
+                </a:solidFill>
+                <a:latin typeface="Calibri"/>
+                <a:cs typeface="Calibri"/>
+              </a:rPr>
+              <a:t>Nominal</a:t>
+            </a:r>
+            <a:r>
+              <a:rPr lang="en-US" sz="2400" b="0" dirty="0">
+                <a:latin typeface="Calibri"/>
+                <a:cs typeface="Calibri"/>
+              </a:rPr>
+              <a:t>/categorial</a:t>
             </a:r>
             <a:br>
               <a:rPr lang="en-US" sz="2400" b="0" dirty="0">
@@ -5503,11 +5647,28 @@
               </a:rPr>
             </a:br>
             <a:r>
+              <a:rPr lang="en-US" sz="2400" dirty="0">
+                <a:latin typeface="Calibri"/>
+                <a:cs typeface="Calibri"/>
+              </a:rPr>
+              <a:t>Our Dependent variable is</a:t>
+            </a:r>
+            <a:r>
               <a:rPr lang="en-US" sz="2400" b="0" dirty="0">
                 <a:latin typeface="Calibri"/>
                 <a:cs typeface="Calibri"/>
               </a:rPr>
-              <a:t>Our Dependent variable is: Mean Scale Score</a:t>
+              <a:t>: </a:t>
+            </a:r>
+            <a:r>
+              <a:rPr lang="en-US" sz="2400" b="0" dirty="0">
+                <a:solidFill>
+                  <a:srgbClr val="FF0000"/>
+                </a:solidFill>
+                <a:latin typeface="Calibri"/>
+                <a:cs typeface="Calibri"/>
+              </a:rPr>
+              <a:t>Mean Scale Score</a:t>
             </a:r>
             <a:br>
               <a:rPr lang="en-US" sz="2400" b="0" dirty="0">
@@ -5530,7 +5691,24 @@
                 <a:latin typeface="Calibri"/>
                 <a:cs typeface="Calibri"/>
               </a:rPr>
-              <a:t>This Dependent variable datatype is  Interval/measurement data</a:t>
+              <a:t>This Dependent variable datatype is  I</a:t>
+            </a:r>
+            <a:r>
+              <a:rPr lang="en-US" sz="2400" b="0" dirty="0">
+                <a:solidFill>
+                  <a:srgbClr val="FF0000"/>
+                </a:solidFill>
+                <a:latin typeface="Calibri"/>
+                <a:cs typeface="Calibri"/>
+              </a:rPr>
+              <a:t>nterval</a:t>
+            </a:r>
+            <a:r>
+              <a:rPr lang="en-US" sz="2400" b="0" dirty="0">
+                <a:latin typeface="Calibri"/>
+                <a:cs typeface="Calibri"/>
+              </a:rPr>
+              <a:t>/measurement data</a:t>
             </a:r>
           </a:p>
         </p:txBody>
@@ -5713,6 +5891,9 @@
             </a:pPr>
             <a:r>
               <a:rPr lang="en-IE" sz="2400" dirty="0">
+                <a:solidFill>
+                  <a:srgbClr val="FF0000"/>
+                </a:solidFill>
                 <a:effectLst/>
                 <a:latin typeface="Calibri"/>
                 <a:ea typeface="Calibri" panose="020F0502020204030204" pitchFamily="34" charset="0"/>
@@ -5722,12 +5903,27 @@
             </a:r>
             <a:r>
               <a:rPr lang="en-IE" sz="2400" baseline="30000" dirty="0">
+                <a:solidFill>
+                  <a:srgbClr val="FF0000"/>
+                </a:solidFill>
                 <a:effectLst/>
                 <a:latin typeface="Calibri"/>
                 <a:ea typeface="Calibri" panose="020F0502020204030204" pitchFamily="34" charset="0"/>
                 <a:cs typeface="Times New Roman"/>
               </a:rPr>
               <a:t>2</a:t>
+            </a:r>
+            <a:r>
+              <a:rPr lang="en-IE" sz="2400" dirty="0">
+                <a:solidFill>
+                  <a:srgbClr val="FF0000"/>
+                </a:solidFill>
+                <a:effectLst/>
+                <a:latin typeface="Calibri"/>
+                <a:ea typeface="Calibri" panose="020F0502020204030204" pitchFamily="34" charset="0"/>
+                <a:cs typeface="Times New Roman"/>
+              </a:rPr>
+              <a:t> </a:t>
             </a:r>
             <a:r>
               <a:rPr lang="en-IE" sz="2400" dirty="0">
@@ -5736,7 +5932,7 @@
                 <a:ea typeface="Calibri" panose="020F0502020204030204" pitchFamily="34" charset="0"/>
                 <a:cs typeface="Times New Roman"/>
               </a:rPr>
-              <a:t> : </a:t>
+              <a:t>: </a:t>
             </a:r>
             <a:r>
               <a:rPr lang="en-IE" sz="2400" b="0" dirty="0">
@@ -5772,6 +5968,60 @@
                 <a:cs typeface="Times New Roman"/>
               </a:rPr>
             </a:br>
+            <a:r>
+              <a:rPr lang="en-US" sz="2400" b="0" dirty="0">
+                <a:solidFill>
+                  <a:srgbClr val="FF0000"/>
+                </a:solidFill>
+                <a:latin typeface="Calibri"/>
+                <a:ea typeface="Calibri" panose="020F0502020204030204" pitchFamily="34" charset="0"/>
+                <a:cs typeface="Times New Roman"/>
+              </a:rPr>
+              <a:t>Comparison of </a:t>
+            </a:r>
+            <a:r>
+              <a:rPr lang="en-US" sz="2400" b="0" dirty="0" err="1">
+                <a:solidFill>
+                  <a:srgbClr val="FF0000"/>
+                </a:solidFill>
+                <a:latin typeface="Calibri"/>
+                <a:ea typeface="Calibri" panose="020F0502020204030204" pitchFamily="34" charset="0"/>
+                <a:cs typeface="Times New Roman"/>
+              </a:rPr>
+              <a:t>Means:</a:t>
+            </a:r>
+            <a:r>
+              <a:rPr lang="en-US" sz="2400" b="0" dirty="0" err="1">
+                <a:latin typeface="Calibri"/>
+                <a:ea typeface="Calibri" panose="020F0502020204030204" pitchFamily="34" charset="0"/>
+                <a:cs typeface="Times New Roman"/>
+              </a:rPr>
+              <a:t>This</a:t>
+            </a:r>
+            <a:r>
+              <a:rPr lang="en-US" sz="2400" b="0" dirty="0">
+                <a:latin typeface="Calibri"/>
+                <a:ea typeface="Calibri" panose="020F0502020204030204" pitchFamily="34" charset="0"/>
+                <a:cs typeface="Times New Roman"/>
+              </a:rPr>
+              <a:t> analysis examines whether the mean math score is significantly different between two demographic </a:t>
+            </a:r>
+            <a:r>
+              <a:rPr lang="en-US" sz="2400" b="0" dirty="0" err="1">
+                <a:latin typeface="Calibri"/>
+                <a:ea typeface="Calibri" panose="020F0502020204030204" pitchFamily="34" charset="0"/>
+                <a:cs typeface="Times New Roman"/>
+              </a:rPr>
+              <a:t>groups.It</a:t>
+            </a:r>
+            <a:r>
+              <a:rPr lang="en-US" sz="2400" b="0" dirty="0">
+                <a:latin typeface="Calibri"/>
+                <a:ea typeface="Calibri" panose="020F0502020204030204" pitchFamily="34" charset="0"/>
+                <a:cs typeface="Times New Roman"/>
+              </a:rPr>
+              <a:t> helps identify whether gender plays a role in student math performance.</a:t>
+            </a:r>
             <a:br>
               <a:rPr lang="en-IE" sz="2400" b="0" dirty="0">
                 <a:effectLst/>
@@ -5791,6 +6041,9 @@
             </a:r>
             <a:r>
               <a:rPr lang="en-GB" sz="2400" b="0" dirty="0">
+                <a:solidFill>
+                  <a:srgbClr val="FF0000"/>
+                </a:solidFill>
                 <a:latin typeface="Arial"/>
                 <a:cs typeface="Arial"/>
               </a:rPr>
@@ -5798,17 +6051,30 @@
             </a:r>
             <a:r>
               <a:rPr lang="en-GB" sz="2400" b="0" baseline="-25000" dirty="0">
+                <a:solidFill>
+                  <a:srgbClr val="FF0000"/>
+                </a:solidFill>
                 <a:latin typeface="Arial"/>
                 <a:cs typeface="Arial"/>
               </a:rPr>
               <a:t>0</a:t>
+            </a:r>
+            <a:r>
+              <a:rPr lang="en-GB" sz="2400" b="0" dirty="0">
+                <a:solidFill>
+                  <a:srgbClr val="FF0000"/>
+                </a:solidFill>
+                <a:latin typeface="Arial"/>
+                <a:cs typeface="Arial"/>
+              </a:rPr>
+              <a:t>): </a:t>
             </a:r>
             <a:r>
               <a:rPr lang="en-GB" sz="2400" b="0" dirty="0">
                 <a:latin typeface="Arial"/>
                 <a:cs typeface="Arial"/>
               </a:rPr>
-              <a:t>): There is no difference in the mean of the </a:t>
+              <a:t>There is no difference in the mean of the </a:t>
             </a:r>
             <a:r>
               <a:rPr lang="en-IE" sz="2400" b="0" dirty="0">
@@ -5838,6 +6104,9 @@
             </a:r>
             <a:r>
               <a:rPr lang="en-GB" sz="2400" b="0" dirty="0">
+                <a:solidFill>
+                  <a:srgbClr val="FF0000"/>
+                </a:solidFill>
                 <a:latin typeface="Arial"/>
                 <a:cs typeface="Arial"/>
               </a:rPr>
@@ -5845,17 +6114,30 @@
             </a:r>
             <a:r>
               <a:rPr lang="en-GB" sz="2400" b="0" baseline="-25000" dirty="0">
+                <a:solidFill>
+                  <a:srgbClr val="FF0000"/>
+                </a:solidFill>
                 <a:latin typeface="Arial"/>
                 <a:cs typeface="Arial"/>
               </a:rPr>
               <a:t>1</a:t>
+            </a:r>
+            <a:r>
+              <a:rPr lang="en-GB" sz="2400" b="0" dirty="0">
+                <a:solidFill>
+                  <a:srgbClr val="FF0000"/>
+                </a:solidFill>
+                <a:latin typeface="Arial"/>
+                <a:cs typeface="Arial"/>
+              </a:rPr>
+              <a:t>): </a:t>
             </a:r>
             <a:r>
               <a:rPr lang="en-GB" sz="2400" b="0" dirty="0">
                 <a:latin typeface="Arial"/>
                 <a:cs typeface="Arial"/>
               </a:rPr>
-              <a:t>): There is</a:t>
+              <a:t>There is</a:t>
             </a:r>
             <a:r>
               <a:rPr lang="en-GB" sz="2400" dirty="0">
@@ -5902,40 +6184,58 @@
                 <a:cs typeface="Times New Roman"/>
               </a:rPr>
             </a:br>
-            <a:br>
+            <a:r>
               <a:rPr lang="en-IE" sz="2400" b="0" dirty="0">
+                <a:solidFill>
+                  <a:srgbClr val="FF0000"/>
+                </a:solidFill>
                 <a:effectLst/>
                 <a:latin typeface="Calibri"/>
                 <a:ea typeface="Calibri" panose="020F0502020204030204" pitchFamily="34" charset="0"/>
                 <a:cs typeface="Times New Roman"/>
               </a:rPr>
-            </a:br>
-            <a:r>
-              <a:rPr lang="en-IE" sz="2400" b="0" dirty="0">
+              <a:t>We  reject the null hypothesis (p = 4.22x10 </a:t>
+            </a:r>
+            <a:r>
+              <a:rPr lang="en-IE" sz="2400" b="0" baseline="30000" dirty="0">
+                <a:solidFill>
+                  <a:srgbClr val="FF0000"/>
+                </a:solidFill>
                 <a:effectLst/>
                 <a:latin typeface="Calibri"/>
                 <a:ea typeface="Calibri" panose="020F0502020204030204" pitchFamily="34" charset="0"/>
                 <a:cs typeface="Times New Roman"/>
               </a:rPr>
-              <a:t>We  reject the null hypothesis (p = 4.22x10 </a:t>
-            </a:r>
-            <a:r>
-              <a:rPr lang="en-IE" sz="2400" b="0" baseline="30000" dirty="0">
+              <a:t>-42 </a:t>
+            </a:r>
+            <a:r>
+              <a:rPr lang="en-IE" sz="2400" b="0" dirty="0">
+                <a:solidFill>
+                  <a:srgbClr val="FF0000"/>
+                </a:solidFill>
                 <a:effectLst/>
                 <a:latin typeface="Calibri"/>
                 <a:ea typeface="Calibri" panose="020F0502020204030204" pitchFamily="34" charset="0"/>
                 <a:cs typeface="Times New Roman"/>
               </a:rPr>
-              <a:t>-42 </a:t>
-            </a:r>
-            <a:r>
-              <a:rPr lang="en-IE" sz="2400" b="0" dirty="0">
+              <a:t>) , confirming a significant difference by gender.</a:t>
+            </a:r>
+            <a:r>
+              <a:rPr kumimoji="0" lang="en-GB" sz="1800" b="0" i="1" u="none" strike="noStrike" kern="1200" cap="none" spc="0" normalizeH="0" baseline="0" noProof="0" dirty="0">
+                <a:ln>
+                  <a:noFill/>
+                </a:ln>
+                <a:solidFill>
+                  <a:srgbClr val="FF0000"/>
+                </a:solidFill>
                 <a:effectLst/>
-                <a:latin typeface="Calibri"/>
-                <a:ea typeface="Calibri" panose="020F0502020204030204" pitchFamily="34" charset="0"/>
-                <a:cs typeface="Times New Roman"/>
-              </a:rPr>
-              <a:t>) , confirming a significant difference by gender.</a:t>
+                <a:uLnTx/>
+                <a:uFillTx/>
+                <a:latin typeface="Arial" panose="020B0604020202020204"/>
+                <a:ea typeface="+mn-ea"/>
+                <a:cs typeface="+mn-cs"/>
+              </a:rPr>
+              <a:t> [p-value = &lt; 0.05] </a:t>
             </a:r>
             <a:br>
               <a:rPr lang="en-IE" sz="2400" b="0" dirty="0">

</xml_diff>

<commit_message>
the RQ ppt and the dataset file
</commit_message>
<xml_diff>
--- a/research_question.ppt.pptx
+++ b/research_question.ppt.pptx
@@ -254,7 +254,7 @@
             <a:fld id="{93FAAC3A-BD1F-4A00-9099-74B95789FE00}" type="datetimeFigureOut">
               <a:rPr lang="en-GB" smtClean="0"/>
               <a:pPr/>
-              <a:t>01/12/2025</a:t>
+              <a:t>03/12/2025</a:t>
             </a:fld>
             <a:endParaRPr lang="en-GB"/>
           </a:p>
@@ -433,7 +433,7 @@
             <a:fld id="{8E359C8A-39F6-4045-9163-4042C4C26B15}" type="datetimeFigureOut">
               <a:rPr lang="en-GB" smtClean="0"/>
               <a:pPr/>
-              <a:t>01/12/2025</a:t>
+              <a:t>03/12/2025</a:t>
             </a:fld>
             <a:endParaRPr lang="en-GB"/>
           </a:p>
@@ -5545,6 +5545,29 @@
             </a:r>
             <a:br>
               <a:rPr lang="en-US" sz="2400" b="0" dirty="0">
+                <a:latin typeface="Calibri"/>
+                <a:cs typeface="Calibri"/>
+              </a:rPr>
+            </a:br>
+            <a:r>
+              <a:rPr lang="en-US" sz="2400" b="0" dirty="0">
+                <a:latin typeface="Calibri"/>
+                <a:cs typeface="Calibri"/>
+              </a:rPr>
+              <a:t>Dataset is from </a:t>
+            </a:r>
+            <a:r>
+              <a:rPr lang="en-US" sz="2400" b="0" dirty="0">
+                <a:solidFill>
+                  <a:srgbClr val="FF0000"/>
+                </a:solidFill>
+                <a:latin typeface="Calibri"/>
+                <a:cs typeface="Calibri"/>
+              </a:rPr>
+              <a:t>Data world</a:t>
+            </a:r>
+            <a:br>
+              <a:rPr lang="en-US" sz="2400" b="0" dirty="0">
                 <a:latin typeface="Calibri" panose="020F0502020204030204" pitchFamily="34" charset="0"/>
                 <a:cs typeface="Calibri" panose="020F0502020204030204" pitchFamily="34" charset="0"/>
               </a:rPr>
@@ -5581,14 +5604,14 @@
                 <a:latin typeface="Calibri"/>
                 <a:cs typeface="Calibri"/>
               </a:rPr>
-              <a:t>Our  Independent variable is</a:t>
+              <a:t>Our  Independent variable is </a:t>
             </a:r>
             <a:r>
               <a:rPr lang="en-US" sz="2400" b="0" dirty="0">
                 <a:latin typeface="Calibri"/>
                 <a:cs typeface="Calibri"/>
               </a:rPr>
-              <a:t>:  </a:t>
+              <a:t>: </a:t>
             </a:r>
             <a:r>
               <a:rPr lang="en-US" sz="2400" b="0" dirty="0">
@@ -5691,7 +5714,7 @@
                 <a:latin typeface="Calibri"/>
                 <a:cs typeface="Calibri"/>
               </a:rPr>
-              <a:t>This Dependent variable datatype is  I</a:t>
+              <a:t>This Dependent variable datatype is  </a:t>
             </a:r>
             <a:r>
               <a:rPr lang="en-US" sz="2400" b="0" dirty="0">
@@ -5701,7 +5724,7 @@
                 <a:latin typeface="Calibri"/>
                 <a:cs typeface="Calibri"/>
               </a:rPr>
-              <a:t>nterval</a:t>
+              <a:t>Interval</a:t>
             </a:r>
             <a:r>
               <a:rPr lang="en-US" sz="2400" b="0" dirty="0">
@@ -5875,7 +5898,7 @@
         <p:spPr>
           <a:xfrm>
             <a:off x="737938" y="1893914"/>
-            <a:ext cx="11085094" cy="3403841"/>
+            <a:ext cx="11085094" cy="3584866"/>
           </a:xfrm>
         </p:spPr>
         <p:txBody>
@@ -5899,31 +5922,7 @@
                 <a:ea typeface="Calibri" panose="020F0502020204030204" pitchFamily="34" charset="0"/>
                 <a:cs typeface="Times New Roman"/>
               </a:rPr>
-              <a:t>Template</a:t>
-            </a:r>
-            <a:r>
-              <a:rPr lang="en-IE" sz="2400" baseline="30000" dirty="0">
-                <a:solidFill>
-                  <a:srgbClr val="FF0000"/>
-                </a:solidFill>
-                <a:effectLst/>
-                <a:latin typeface="Calibri"/>
-                <a:ea typeface="Calibri" panose="020F0502020204030204" pitchFamily="34" charset="0"/>
-                <a:cs typeface="Times New Roman"/>
-              </a:rPr>
-              <a:t>2</a:t>
-            </a:r>
-            <a:r>
-              <a:rPr lang="en-IE" sz="2400" dirty="0">
-                <a:solidFill>
-                  <a:srgbClr val="FF0000"/>
-                </a:solidFill>
-                <a:effectLst/>
-                <a:latin typeface="Calibri"/>
-                <a:ea typeface="Calibri" panose="020F0502020204030204" pitchFamily="34" charset="0"/>
-                <a:cs typeface="Times New Roman"/>
-              </a:rPr>
-              <a:t> </a:t>
+              <a:t>RQ </a:t>
             </a:r>
             <a:r>
               <a:rPr lang="en-IE" sz="2400" dirty="0">
@@ -5958,223 +5957,25 @@
                 <a:ea typeface="Calibri" panose="020F0502020204030204" pitchFamily="34" charset="0"/>
                 <a:cs typeface="Times New Roman"/>
               </a:rPr>
-              <a:t>data “is there a difference in the mean of  Mean Scale Score between Male and Female students”</a:t>
-            </a:r>
-            <a:br>
+              <a:t>data “In </a:t>
+            </a:r>
+            <a:r>
+              <a:rPr lang="en-IE" sz="2400" b="0" dirty="0" err="1">
+                <a:effectLst/>
+                <a:latin typeface="Calibri"/>
+                <a:ea typeface="Calibri" panose="020F0502020204030204" pitchFamily="34" charset="0"/>
+                <a:cs typeface="Times New Roman"/>
+              </a:rPr>
+              <a:t>NewYork</a:t>
+            </a:r>
+            <a:r>
               <a:rPr lang="en-IE" sz="2400" b="0" dirty="0">
                 <a:effectLst/>
                 <a:latin typeface="Calibri"/>
                 <a:ea typeface="Calibri" panose="020F0502020204030204" pitchFamily="34" charset="0"/>
                 <a:cs typeface="Times New Roman"/>
               </a:rPr>
-            </a:br>
-            <a:r>
-              <a:rPr lang="en-US" sz="2400" b="0" dirty="0">
-                <a:solidFill>
-                  <a:srgbClr val="FF0000"/>
-                </a:solidFill>
-                <a:latin typeface="Calibri"/>
-                <a:ea typeface="Calibri" panose="020F0502020204030204" pitchFamily="34" charset="0"/>
-                <a:cs typeface="Times New Roman"/>
-              </a:rPr>
-              <a:t>Comparison of </a:t>
-            </a:r>
-            <a:r>
-              <a:rPr lang="en-US" sz="2400" b="0" dirty="0" err="1">
-                <a:solidFill>
-                  <a:srgbClr val="FF0000"/>
-                </a:solidFill>
-                <a:latin typeface="Calibri"/>
-                <a:ea typeface="Calibri" panose="020F0502020204030204" pitchFamily="34" charset="0"/>
-                <a:cs typeface="Times New Roman"/>
-              </a:rPr>
-              <a:t>Means:</a:t>
-            </a:r>
-            <a:r>
-              <a:rPr lang="en-US" sz="2400" b="0" dirty="0" err="1">
-                <a:latin typeface="Calibri"/>
-                <a:ea typeface="Calibri" panose="020F0502020204030204" pitchFamily="34" charset="0"/>
-                <a:cs typeface="Times New Roman"/>
-              </a:rPr>
-              <a:t>This</a:t>
-            </a:r>
-            <a:r>
-              <a:rPr lang="en-US" sz="2400" b="0" dirty="0">
-                <a:latin typeface="Calibri"/>
-                <a:ea typeface="Calibri" panose="020F0502020204030204" pitchFamily="34" charset="0"/>
-                <a:cs typeface="Times New Roman"/>
-              </a:rPr>
-              <a:t> analysis examines whether the mean math score is significantly different between two demographic </a:t>
-            </a:r>
-            <a:r>
-              <a:rPr lang="en-US" sz="2400" b="0" dirty="0" err="1">
-                <a:latin typeface="Calibri"/>
-                <a:ea typeface="Calibri" panose="020F0502020204030204" pitchFamily="34" charset="0"/>
-                <a:cs typeface="Times New Roman"/>
-              </a:rPr>
-              <a:t>groups.It</a:t>
-            </a:r>
-            <a:r>
-              <a:rPr lang="en-US" sz="2400" b="0" dirty="0">
-                <a:latin typeface="Calibri"/>
-                <a:ea typeface="Calibri" panose="020F0502020204030204" pitchFamily="34" charset="0"/>
-                <a:cs typeface="Times New Roman"/>
-              </a:rPr>
-              <a:t> helps identify whether gender plays a role in student math performance.</a:t>
-            </a:r>
-            <a:br>
-              <a:rPr lang="en-IE" sz="2400" b="0" dirty="0">
-                <a:effectLst/>
-                <a:latin typeface="Calibri"/>
-                <a:ea typeface="Calibri" panose="020F0502020204030204" pitchFamily="34" charset="0"/>
-                <a:cs typeface="Times New Roman"/>
-              </a:rPr>
-            </a:br>
-            <a:r>
-              <a:rPr lang="en-IE" sz="2400" b="0" dirty="0">
-                <a:effectLst/>
-                <a:latin typeface="Calibri"/>
-                <a:ea typeface="Calibri" panose="020F0502020204030204" pitchFamily="34" charset="0"/>
-                <a:cs typeface="Times New Roman"/>
-              </a:rPr>
-              <a:t>1. </a:t>
-            </a:r>
-            <a:r>
-              <a:rPr lang="en-GB" sz="2400" b="0" dirty="0">
-                <a:solidFill>
-                  <a:srgbClr val="FF0000"/>
-                </a:solidFill>
-                <a:latin typeface="Arial"/>
-                <a:cs typeface="Arial"/>
-              </a:rPr>
-              <a:t>Null hypothesis (H</a:t>
-            </a:r>
-            <a:r>
-              <a:rPr lang="en-GB" sz="2400" b="0" baseline="-25000" dirty="0">
-                <a:solidFill>
-                  <a:srgbClr val="FF0000"/>
-                </a:solidFill>
-                <a:latin typeface="Arial"/>
-                <a:cs typeface="Arial"/>
-              </a:rPr>
-              <a:t>0</a:t>
-            </a:r>
-            <a:r>
-              <a:rPr lang="en-GB" sz="2400" b="0" dirty="0">
-                <a:solidFill>
-                  <a:srgbClr val="FF0000"/>
-                </a:solidFill>
-                <a:latin typeface="Arial"/>
-                <a:cs typeface="Arial"/>
-              </a:rPr>
-              <a:t>): </a:t>
-            </a:r>
-            <a:r>
-              <a:rPr lang="en-GB" sz="2400" b="0" dirty="0">
-                <a:latin typeface="Arial"/>
-                <a:cs typeface="Arial"/>
-              </a:rPr>
-              <a:t>There is no difference in the mean of the </a:t>
-            </a:r>
-            <a:r>
-              <a:rPr lang="en-IE" sz="2400" b="0" dirty="0">
-                <a:effectLst/>
-                <a:latin typeface="Calibri"/>
-                <a:ea typeface="Calibri" panose="020F0502020204030204" pitchFamily="34" charset="0"/>
-                <a:cs typeface="Times New Roman"/>
-              </a:rPr>
-              <a:t>Mean Scale Score between Male and Female students.</a:t>
-            </a:r>
-            <a:br>
-              <a:rPr lang="en-IE" sz="2400" b="0" dirty="0">
-                <a:effectLst/>
-                <a:latin typeface="Calibri"/>
-                <a:ea typeface="Calibri" panose="020F0502020204030204" pitchFamily="34" charset="0"/>
-                <a:cs typeface="Times New Roman"/>
-              </a:rPr>
-            </a:br>
-            <a:r>
-              <a:rPr lang="en-IE" sz="2400" b="0" dirty="0">
-                <a:effectLst/>
-                <a:latin typeface="Calibri"/>
-                <a:ea typeface="Calibri" panose="020F0502020204030204" pitchFamily="34" charset="0"/>
-                <a:cs typeface="Times New Roman"/>
-              </a:rPr>
-              <a:t>2. </a:t>
-            </a:r>
-            <a:r>
-              <a:rPr lang="en-GB" sz="2400" b="0" dirty="0">
-                <a:solidFill>
-                  <a:srgbClr val="FF0000"/>
-                </a:solidFill>
-                <a:latin typeface="Arial"/>
-                <a:cs typeface="Arial"/>
-              </a:rPr>
-              <a:t>Alt hypothesis (H</a:t>
-            </a:r>
-            <a:r>
-              <a:rPr lang="en-GB" sz="2400" b="0" baseline="-25000" dirty="0">
-                <a:solidFill>
-                  <a:srgbClr val="FF0000"/>
-                </a:solidFill>
-                <a:latin typeface="Arial"/>
-                <a:cs typeface="Arial"/>
-              </a:rPr>
-              <a:t>1</a:t>
-            </a:r>
-            <a:r>
-              <a:rPr lang="en-GB" sz="2400" b="0" dirty="0">
-                <a:solidFill>
-                  <a:srgbClr val="FF0000"/>
-                </a:solidFill>
-                <a:latin typeface="Arial"/>
-                <a:cs typeface="Arial"/>
-              </a:rPr>
-              <a:t>): </a:t>
-            </a:r>
-            <a:r>
-              <a:rPr lang="en-GB" sz="2400" b="0" dirty="0">
-                <a:latin typeface="Arial"/>
-                <a:cs typeface="Arial"/>
-              </a:rPr>
-              <a:t>There is</a:t>
-            </a:r>
-            <a:r>
-              <a:rPr lang="en-GB" sz="2400" dirty="0">
-                <a:latin typeface="Arial"/>
-                <a:cs typeface="Arial"/>
-              </a:rPr>
-              <a:t> </a:t>
-            </a:r>
-            <a:r>
-              <a:rPr lang="en-GB" sz="2400" b="0" dirty="0">
-                <a:latin typeface="Arial"/>
-                <a:cs typeface="Arial"/>
-              </a:rPr>
-              <a:t>a</a:t>
-            </a:r>
-            <a:r>
-              <a:rPr lang="en-GB" sz="2400" dirty="0">
-                <a:latin typeface="Arial"/>
-                <a:cs typeface="Arial"/>
-              </a:rPr>
-              <a:t> </a:t>
-            </a:r>
-            <a:r>
-              <a:rPr lang="en-GB" sz="2400" b="0" dirty="0">
-                <a:latin typeface="Arial"/>
-                <a:cs typeface="Arial"/>
-              </a:rPr>
-              <a:t>difference in the mean of  the </a:t>
-            </a:r>
-            <a:r>
-              <a:rPr lang="en-IE" sz="2400" b="0" dirty="0">
-                <a:effectLst/>
-                <a:latin typeface="Calibri"/>
-                <a:ea typeface="Calibri" panose="020F0502020204030204" pitchFamily="34" charset="0"/>
-                <a:cs typeface="Times New Roman"/>
-              </a:rPr>
-              <a:t>Mean Scale Score between Male and Female students.</a:t>
+              <a:t> City  Grade  3 to 8  in year 2006 to 2012 , is there any difference between mean scale score and demographic ”</a:t>
             </a:r>
             <a:br>
               <a:rPr lang="en-IE" sz="2400" b="0" dirty="0">
@@ -6194,49 +5995,215 @@
                 <a:ea typeface="Calibri" panose="020F0502020204030204" pitchFamily="34" charset="0"/>
                 <a:cs typeface="Times New Roman"/>
               </a:rPr>
-              <a:t>We  reject the null hypothesis (p = 4.22x10 </a:t>
-            </a:r>
-            <a:r>
-              <a:rPr lang="en-IE" sz="2400" b="0" baseline="30000" dirty="0">
+              <a:t>Difference in </a:t>
+            </a:r>
+            <a:r>
+              <a:rPr lang="en-US" sz="2400" b="0" dirty="0">
                 <a:solidFill>
                   <a:srgbClr val="FF0000"/>
                 </a:solidFill>
+                <a:latin typeface="Calibri"/>
+                <a:ea typeface="Calibri" panose="020F0502020204030204" pitchFamily="34" charset="0"/>
+                <a:cs typeface="Times New Roman"/>
+              </a:rPr>
+              <a:t>Mean: </a:t>
+            </a:r>
+            <a:r>
+              <a:rPr lang="en-US" sz="2400" b="0" dirty="0">
+                <a:latin typeface="Calibri"/>
+                <a:ea typeface="Calibri" panose="020F0502020204030204" pitchFamily="34" charset="0"/>
+                <a:cs typeface="Times New Roman"/>
+              </a:rPr>
+              <a:t>whether the </a:t>
+            </a:r>
+            <a:r>
+              <a:rPr lang="en-US" sz="2400" b="0" dirty="0">
+                <a:solidFill>
+                  <a:srgbClr val="FF0000"/>
+                </a:solidFill>
+                <a:latin typeface="Calibri"/>
+                <a:ea typeface="Calibri" panose="020F0502020204030204" pitchFamily="34" charset="0"/>
+                <a:cs typeface="Times New Roman"/>
+              </a:rPr>
+              <a:t>mean math score </a:t>
+            </a:r>
+            <a:r>
+              <a:rPr lang="en-US" sz="2400" b="0" dirty="0">
+                <a:latin typeface="Calibri"/>
+                <a:ea typeface="Calibri" panose="020F0502020204030204" pitchFamily="34" charset="0"/>
+                <a:cs typeface="Times New Roman"/>
+              </a:rPr>
+              <a:t>is significantly different between two demographic groups. It helps identify whether gender plays a role in student math performance.</a:t>
+            </a:r>
+            <a:br>
+              <a:rPr lang="en-US" sz="2400" b="0" dirty="0">
+                <a:latin typeface="Calibri"/>
+                <a:ea typeface="Calibri" panose="020F0502020204030204" pitchFamily="34" charset="0"/>
+                <a:cs typeface="Times New Roman"/>
+              </a:rPr>
+            </a:br>
+            <a:br>
+              <a:rPr lang="en-IE" sz="2400" b="0" dirty="0">
                 <a:effectLst/>
                 <a:latin typeface="Calibri"/>
                 <a:ea typeface="Calibri" panose="020F0502020204030204" pitchFamily="34" charset="0"/>
                 <a:cs typeface="Times New Roman"/>
               </a:rPr>
-              <a:t>-42 </a:t>
-            </a:r>
+            </a:br>
             <a:r>
               <a:rPr lang="en-IE" sz="2400" b="0" dirty="0">
-                <a:solidFill>
-                  <a:srgbClr val="FF0000"/>
-                </a:solidFill>
                 <a:effectLst/>
                 <a:latin typeface="Calibri"/>
                 <a:ea typeface="Calibri" panose="020F0502020204030204" pitchFamily="34" charset="0"/>
                 <a:cs typeface="Times New Roman"/>
               </a:rPr>
-              <a:t>) , confirming a significant difference by gender.</a:t>
-            </a:r>
-            <a:r>
-              <a:rPr kumimoji="0" lang="en-GB" sz="1800" b="0" i="1" u="none" strike="noStrike" kern="1200" cap="none" spc="0" normalizeH="0" baseline="0" noProof="0" dirty="0">
-                <a:ln>
-                  <a:noFill/>
-                </a:ln>
+              <a:t>1. </a:t>
+            </a:r>
+            <a:r>
+              <a:rPr lang="en-GB" sz="2400" b="0" dirty="0">
                 <a:solidFill>
                   <a:srgbClr val="FF0000"/>
                 </a:solidFill>
+                <a:latin typeface="Arial"/>
+                <a:cs typeface="Arial"/>
+              </a:rPr>
+              <a:t>Null hypothesis (H</a:t>
+            </a:r>
+            <a:r>
+              <a:rPr lang="en-GB" sz="2400" b="0" baseline="-25000" dirty="0">
+                <a:solidFill>
+                  <a:srgbClr val="FF0000"/>
+                </a:solidFill>
+                <a:latin typeface="Arial"/>
+                <a:cs typeface="Arial"/>
+              </a:rPr>
+              <a:t>0</a:t>
+            </a:r>
+            <a:r>
+              <a:rPr lang="en-GB" sz="2400" b="0" dirty="0">
+                <a:solidFill>
+                  <a:srgbClr val="FF0000"/>
+                </a:solidFill>
+                <a:latin typeface="Arial"/>
+                <a:cs typeface="Arial"/>
+              </a:rPr>
+              <a:t>): </a:t>
+            </a:r>
+            <a:r>
+              <a:rPr lang="en-GB" sz="2400" b="0" dirty="0">
+                <a:latin typeface="Arial"/>
+                <a:cs typeface="Arial"/>
+              </a:rPr>
+              <a:t>There is no difference in the mean of the </a:t>
+            </a:r>
+            <a:r>
+              <a:rPr lang="en-IE" sz="2400" b="0" dirty="0">
                 <a:effectLst/>
-                <a:uLnTx/>
-                <a:uFillTx/>
-                <a:latin typeface="Arial" panose="020B0604020202020204"/>
-                <a:ea typeface="+mn-ea"/>
-                <a:cs typeface="+mn-cs"/>
-              </a:rPr>
-              <a:t> [p-value = &lt; 0.05] </a:t>
-            </a:r>
+                <a:latin typeface="Calibri"/>
+                <a:ea typeface="Calibri" panose="020F0502020204030204" pitchFamily="34" charset="0"/>
+                <a:cs typeface="Times New Roman"/>
+              </a:rPr>
+              <a:t>Mean Scale Score between Male and Female students.</a:t>
+            </a:r>
+            <a:br>
+              <a:rPr lang="en-IE" sz="2400" b="0" dirty="0">
+                <a:effectLst/>
+                <a:latin typeface="Calibri"/>
+                <a:ea typeface="Calibri" panose="020F0502020204030204" pitchFamily="34" charset="0"/>
+                <a:cs typeface="Times New Roman"/>
+              </a:rPr>
+            </a:br>
+            <a:r>
+              <a:rPr lang="en-IE" sz="2400" b="0" dirty="0">
+                <a:effectLst/>
+                <a:latin typeface="Calibri"/>
+                <a:ea typeface="Calibri" panose="020F0502020204030204" pitchFamily="34" charset="0"/>
+                <a:cs typeface="Times New Roman"/>
+              </a:rPr>
+              <a:t>2. </a:t>
+            </a:r>
+            <a:r>
+              <a:rPr lang="en-GB" sz="2400" b="0" dirty="0">
+                <a:solidFill>
+                  <a:srgbClr val="FF0000"/>
+                </a:solidFill>
+                <a:latin typeface="Arial"/>
+                <a:cs typeface="Arial"/>
+              </a:rPr>
+              <a:t>Alt hypothesis (H</a:t>
+            </a:r>
+            <a:r>
+              <a:rPr lang="en-GB" sz="2400" b="0" baseline="-25000" dirty="0">
+                <a:solidFill>
+                  <a:srgbClr val="FF0000"/>
+                </a:solidFill>
+                <a:latin typeface="Arial"/>
+                <a:cs typeface="Arial"/>
+              </a:rPr>
+              <a:t>1</a:t>
+            </a:r>
+            <a:r>
+              <a:rPr lang="en-GB" sz="2400" b="0" dirty="0">
+                <a:solidFill>
+                  <a:srgbClr val="FF0000"/>
+                </a:solidFill>
+                <a:latin typeface="Arial"/>
+                <a:cs typeface="Arial"/>
+              </a:rPr>
+              <a:t>): </a:t>
+            </a:r>
+            <a:r>
+              <a:rPr lang="en-GB" sz="2400" b="0" dirty="0">
+                <a:latin typeface="Arial"/>
+                <a:cs typeface="Arial"/>
+              </a:rPr>
+              <a:t>There is</a:t>
+            </a:r>
+            <a:r>
+              <a:rPr lang="en-GB" sz="2400" dirty="0">
+                <a:latin typeface="Arial"/>
+                <a:cs typeface="Arial"/>
+              </a:rPr>
+              <a:t> </a:t>
+            </a:r>
+            <a:r>
+              <a:rPr lang="en-GB" sz="2400" b="0" dirty="0">
+                <a:latin typeface="Arial"/>
+                <a:cs typeface="Arial"/>
+              </a:rPr>
+              <a:t>a</a:t>
+            </a:r>
+            <a:r>
+              <a:rPr lang="en-GB" sz="2400" dirty="0">
+                <a:latin typeface="Arial"/>
+                <a:cs typeface="Arial"/>
+              </a:rPr>
+              <a:t> </a:t>
+            </a:r>
+            <a:r>
+              <a:rPr lang="en-GB" sz="2400" b="0" dirty="0">
+                <a:latin typeface="Arial"/>
+                <a:cs typeface="Arial"/>
+              </a:rPr>
+              <a:t>difference in the mean of  the </a:t>
+            </a:r>
+            <a:r>
+              <a:rPr lang="en-IE" sz="2400" b="0" dirty="0">
+                <a:effectLst/>
+                <a:latin typeface="Calibri"/>
+                <a:ea typeface="Calibri" panose="020F0502020204030204" pitchFamily="34" charset="0"/>
+                <a:cs typeface="Times New Roman"/>
+              </a:rPr>
+              <a:t>Mean Scale Score between Male and Female students.</a:t>
+            </a:r>
+            <a:br>
+              <a:rPr lang="en-IE" sz="2400" b="0" dirty="0">
+                <a:effectLst/>
+                <a:latin typeface="Calibri"/>
+                <a:ea typeface="Calibri" panose="020F0502020204030204" pitchFamily="34" charset="0"/>
+                <a:cs typeface="Times New Roman"/>
+              </a:rPr>
+            </a:br>
             <a:br>
               <a:rPr lang="en-IE" sz="2400" b="0" dirty="0">
                 <a:effectLst/>

</xml_diff>